<commit_message>
Atualizando material de Apresentção - Mapa PMBOK
</commit_message>
<xml_diff>
--- a/GPP_Material/08-Mapa_PMbOK/apresentação_GPP_SIGS_2017_1.pptx.pptx
+++ b/GPP_Material/08-Mapa_PMbOK/apresentação_GPP_SIGS_2017_1.pptx.pptx
@@ -25,17 +25,16 @@
     <p:sldId id="270" r:id="rId19"/>
     <p:sldId id="271" r:id="rId20"/>
     <p:sldId id="272" r:id="rId21"/>
-    <p:sldId id="273" r:id="rId22"/>
   </p:sldIdLst>
   <p:sldSz cy="6858000" cx="9144000"/>
   <p:notesSz cx="6858000" cy="9144000"/>
   <p:embeddedFontLst>
     <p:embeddedFont>
       <p:font typeface="Source Sans Pro"/>
-      <p:regular r:id="rId23"/>
-      <p:bold r:id="rId24"/>
-      <p:italic r:id="rId25"/>
-      <p:boldItalic r:id="rId26"/>
+      <p:regular r:id="rId22"/>
+      <p:bold r:id="rId23"/>
+      <p:italic r:id="rId24"/>
+      <p:boldItalic r:id="rId25"/>
     </p:embeddedFont>
   </p:embeddedFontLst>
   <p:defaultTextStyle>
@@ -717,7 +716,7 @@
         <p:spPr>
           <a:xfrm>
             <a:off x="685800" y="4343400"/>
-            <a:ext cx="5486400" cy="4114800"/>
+            <a:ext cx="5486399" cy="4114800"/>
           </a:xfrm>
           <a:prstGeom prst="rect">
             <a:avLst/>
@@ -733,7 +732,7 @@
           </a:bodyPr>
           <a:lstStyle/>
           <a:p>
-            <a:pPr lvl="0" rtl="0">
+            <a:pPr lvl="0">
               <a:spcBef>
                 <a:spcPts val="0"/>
               </a:spcBef>
@@ -757,7 +756,7 @@
         <p:spPr>
           <a:xfrm>
             <a:off x="1143225" y="685800"/>
-            <a:ext cx="4572300" cy="3429000"/>
+            <a:ext cx="4572225" cy="3429000"/>
           </a:xfrm>
           <a:custGeom>
             <a:pathLst>
@@ -793,7 +792,7 @@
   <p:cSld>
     <p:spTree>
       <p:nvGrpSpPr>
-        <p:cNvPr id="166" name="Shape 166"/>
+        <p:cNvPr id="167" name="Shape 167"/>
         <p:cNvGrpSpPr/>
         <p:nvPr/>
       </p:nvGrpSpPr>
@@ -807,7 +806,7 @@
       </p:grpSpPr>
       <p:sp>
         <p:nvSpPr>
-          <p:cNvPr id="167" name="Shape 167"/>
+          <p:cNvPr id="168" name="Shape 168"/>
           <p:cNvSpPr txBox="1"/>
           <p:nvPr>
             <p:ph idx="1" type="body"/>
@@ -847,7 +846,7 @@
       </p:sp>
       <p:sp>
         <p:nvSpPr>
-          <p:cNvPr id="168" name="Shape 168"/>
+          <p:cNvPr id="169" name="Shape 169"/>
           <p:cNvSpPr/>
           <p:nvPr>
             <p:ph idx="2" type="sldImg"/>
@@ -1014,7 +1013,7 @@
         <p:spPr>
           <a:xfrm>
             <a:off x="685800" y="4343400"/>
-            <a:ext cx="5486399" cy="4114800"/>
+            <a:ext cx="5486400" cy="4114800"/>
           </a:xfrm>
           <a:prstGeom prst="rect">
             <a:avLst/>
@@ -1030,7 +1029,7 @@
           </a:bodyPr>
           <a:lstStyle/>
           <a:p>
-            <a:pPr lvl="0">
+            <a:pPr lvl="0" rtl="0">
               <a:spcBef>
                 <a:spcPts val="0"/>
               </a:spcBef>
@@ -1054,7 +1053,7 @@
         <p:spPr>
           <a:xfrm>
             <a:off x="1143225" y="685800"/>
-            <a:ext cx="4572225" cy="3429000"/>
+            <a:ext cx="4572300" cy="3429000"/>
           </a:xfrm>
           <a:custGeom>
             <a:pathLst>
@@ -1212,105 +1211,6 @@
         <p:spPr>
           <a:xfrm>
             <a:off x="685800" y="4343400"/>
-            <a:ext cx="5486400" cy="4114800"/>
-          </a:xfrm>
-          <a:prstGeom prst="rect">
-            <a:avLst/>
-          </a:prstGeom>
-          <a:noFill/>
-          <a:ln>
-            <a:noFill/>
-          </a:ln>
-        </p:spPr>
-        <p:txBody>
-          <a:bodyPr anchorCtr="0" anchor="ctr" bIns="91425" lIns="91425" rIns="91425" tIns="91425">
-            <a:noAutofit/>
-          </a:bodyPr>
-          <a:lstStyle/>
-          <a:p>
-            <a:pPr lvl="0" rtl="0">
-              <a:spcBef>
-                <a:spcPts val="0"/>
-              </a:spcBef>
-              <a:buNone/>
-            </a:pPr>
-            <a:r>
-              <a:t/>
-            </a:r>
-            <a:endParaRPr/>
-          </a:p>
-        </p:txBody>
-      </p:sp>
-      <p:sp>
-        <p:nvSpPr>
-          <p:cNvPr id="193" name="Shape 193"/>
-          <p:cNvSpPr/>
-          <p:nvPr>
-            <p:ph idx="2" type="sldImg"/>
-          </p:nvPr>
-        </p:nvSpPr>
-        <p:spPr>
-          <a:xfrm>
-            <a:off x="1143225" y="685800"/>
-            <a:ext cx="4572300" cy="3429000"/>
-          </a:xfrm>
-          <a:custGeom>
-            <a:pathLst>
-              <a:path extrusionOk="0" h="120000" w="120000">
-                <a:moveTo>
-                  <a:pt x="0" y="0"/>
-                </a:moveTo>
-                <a:lnTo>
-                  <a:pt x="120000" y="0"/>
-                </a:lnTo>
-                <a:lnTo>
-                  <a:pt x="120000" y="120000"/>
-                </a:lnTo>
-                <a:lnTo>
-                  <a:pt x="0" y="120000"/>
-                </a:lnTo>
-                <a:close/>
-              </a:path>
-            </a:pathLst>
-          </a:custGeom>
-        </p:spPr>
-      </p:sp>
-    </p:spTree>
-  </p:cSld>
-  <p:clrMapOvr>
-    <a:masterClrMapping/>
-  </p:clrMapOvr>
-</p:notes>
-</file>
-
-<file path=ppt/notesSlides/notesSlide18.xml><?xml version="1.0" encoding="utf-8"?>
-<p:notes xmlns:a="http://schemas.openxmlformats.org/drawingml/2006/main" xmlns:r="http://schemas.openxmlformats.org/officeDocument/2006/relationships" xmlns:mc="http://schemas.openxmlformats.org/markup-compatibility/2006" xmlns:mv="urn:schemas-microsoft-com:mac:vml" xmlns:p="http://schemas.openxmlformats.org/presentationml/2006/main" xmlns:c="http://schemas.openxmlformats.org/drawingml/2006/chart" xmlns:dgm="http://schemas.openxmlformats.org/drawingml/2006/diagram" xmlns:o="urn:schemas-microsoft-com:office:office" xmlns:v="urn:schemas-microsoft-com:vml" xmlns:pvml="urn:schemas-microsoft-com:office:powerpoint" xmlns:com="http://schemas.openxmlformats.org/drawingml/2006/compatibility" xmlns:p14="http://schemas.microsoft.com/office/powerpoint/2010/main" showMasterPhAnim="0" showMasterSp="0">
-  <p:cSld>
-    <p:spTree>
-      <p:nvGrpSpPr>
-        <p:cNvPr id="197" name="Shape 197"/>
-        <p:cNvGrpSpPr/>
-        <p:nvPr/>
-      </p:nvGrpSpPr>
-      <p:grpSpPr>
-        <a:xfrm>
-          <a:off x="0" y="0"/>
-          <a:ext cx="0" cy="0"/>
-          <a:chOff x="0" y="0"/>
-          <a:chExt cx="0" cy="0"/>
-        </a:xfrm>
-      </p:grpSpPr>
-      <p:sp>
-        <p:nvSpPr>
-          <p:cNvPr id="198" name="Shape 198"/>
-          <p:cNvSpPr txBox="1"/>
-          <p:nvPr>
-            <p:ph idx="1" type="body"/>
-          </p:nvPr>
-        </p:nvSpPr>
-        <p:spPr>
-          <a:xfrm>
-            <a:off x="685800" y="4343400"/>
             <a:ext cx="5486399" cy="4114800"/>
           </a:xfrm>
           <a:prstGeom prst="rect">
@@ -1342,7 +1242,7 @@
       </p:sp>
       <p:sp>
         <p:nvSpPr>
-          <p:cNvPr id="199" name="Shape 199"/>
+          <p:cNvPr id="193" name="Shape 193"/>
           <p:cNvSpPr/>
           <p:nvPr>
             <p:ph idx="2" type="sldImg"/>
@@ -1577,7 +1477,7 @@
   <p:cSld>
     <p:spTree>
       <p:nvGrpSpPr>
-        <p:cNvPr id="109" name="Shape 109"/>
+        <p:cNvPr id="110" name="Shape 110"/>
         <p:cNvGrpSpPr/>
         <p:nvPr/>
       </p:nvGrpSpPr>
@@ -1591,7 +1491,47 @@
       </p:grpSpPr>
       <p:sp>
         <p:nvSpPr>
-          <p:cNvPr id="110" name="Shape 110"/>
+          <p:cNvPr id="111" name="Shape 111"/>
+          <p:cNvSpPr txBox="1"/>
+          <p:nvPr>
+            <p:ph idx="1" type="body"/>
+          </p:nvPr>
+        </p:nvSpPr>
+        <p:spPr>
+          <a:xfrm>
+            <a:off x="685800" y="4343400"/>
+            <a:ext cx="5486399" cy="4114800"/>
+          </a:xfrm>
+          <a:prstGeom prst="rect">
+            <a:avLst/>
+          </a:prstGeom>
+          <a:noFill/>
+          <a:ln>
+            <a:noFill/>
+          </a:ln>
+        </p:spPr>
+        <p:txBody>
+          <a:bodyPr anchorCtr="0" anchor="ctr" bIns="91425" lIns="91425" rIns="91425" tIns="91425">
+            <a:noAutofit/>
+          </a:bodyPr>
+          <a:lstStyle/>
+          <a:p>
+            <a:pPr lvl="0">
+              <a:spcBef>
+                <a:spcPts val="0"/>
+              </a:spcBef>
+              <a:buNone/>
+            </a:pPr>
+            <a:r>
+              <a:t/>
+            </a:r>
+            <a:endParaRPr/>
+          </a:p>
+        </p:txBody>
+      </p:sp>
+      <p:sp>
+        <p:nvSpPr>
+          <p:cNvPr id="112" name="Shape 112"/>
           <p:cNvSpPr/>
           <p:nvPr>
             <p:ph idx="2" type="sldImg"/>
@@ -1600,7 +1540,7 @@
         <p:spPr>
           <a:xfrm>
             <a:off x="1143225" y="685800"/>
-            <a:ext cx="4572300" cy="3429000"/>
+            <a:ext cx="4572225" cy="3429000"/>
           </a:xfrm>
           <a:custGeom>
             <a:pathLst>
@@ -1622,42 +1562,6 @@
             </a:pathLst>
           </a:custGeom>
         </p:spPr>
-      </p:sp>
-      <p:sp>
-        <p:nvSpPr>
-          <p:cNvPr id="111" name="Shape 111"/>
-          <p:cNvSpPr txBox="1"/>
-          <p:nvPr>
-            <p:ph idx="1" type="body"/>
-          </p:nvPr>
-        </p:nvSpPr>
-        <p:spPr>
-          <a:xfrm>
-            <a:off x="685800" y="4343400"/>
-            <a:ext cx="5486400" cy="4114800"/>
-          </a:xfrm>
-          <a:prstGeom prst="rect">
-            <a:avLst/>
-          </a:prstGeom>
-        </p:spPr>
-        <p:txBody>
-          <a:bodyPr anchorCtr="0" anchor="t" bIns="91425" lIns="91425" rIns="91425" tIns="91425">
-            <a:noAutofit/>
-          </a:bodyPr>
-          <a:lstStyle/>
-          <a:p>
-            <a:pPr lvl="0">
-              <a:spcBef>
-                <a:spcPts val="0"/>
-              </a:spcBef>
-              <a:buNone/>
-            </a:pPr>
-            <a:r>
-              <a:t/>
-            </a:r>
-            <a:endParaRPr/>
-          </a:p>
-        </p:txBody>
       </p:sp>
     </p:spTree>
   </p:cSld>
@@ -1771,7 +1675,7 @@
   <p:cSld>
     <p:spTree>
       <p:nvGrpSpPr>
-        <p:cNvPr id="122" name="Shape 122"/>
+        <p:cNvPr id="123" name="Shape 123"/>
         <p:cNvGrpSpPr/>
         <p:nvPr/>
       </p:nvGrpSpPr>
@@ -1785,7 +1689,7 @@
       </p:grpSpPr>
       <p:sp>
         <p:nvSpPr>
-          <p:cNvPr id="123" name="Shape 123"/>
+          <p:cNvPr id="124" name="Shape 124"/>
           <p:cNvSpPr txBox="1"/>
           <p:nvPr>
             <p:ph idx="1" type="body"/>
@@ -1825,7 +1729,7 @@
       </p:sp>
       <p:sp>
         <p:nvSpPr>
-          <p:cNvPr id="124" name="Shape 124"/>
+          <p:cNvPr id="125" name="Shape 125"/>
           <p:cNvSpPr/>
           <p:nvPr>
             <p:ph idx="2" type="sldImg"/>
@@ -1870,7 +1774,7 @@
   <p:cSld>
     <p:spTree>
       <p:nvGrpSpPr>
-        <p:cNvPr id="129" name="Shape 129"/>
+        <p:cNvPr id="130" name="Shape 130"/>
         <p:cNvGrpSpPr/>
         <p:nvPr/>
       </p:nvGrpSpPr>
@@ -1884,7 +1788,7 @@
       </p:grpSpPr>
       <p:sp>
         <p:nvSpPr>
-          <p:cNvPr id="130" name="Shape 130"/>
+          <p:cNvPr id="131" name="Shape 131"/>
           <p:cNvSpPr txBox="1"/>
           <p:nvPr>
             <p:ph idx="1" type="body"/>
@@ -1893,7 +1797,7 @@
         <p:spPr>
           <a:xfrm>
             <a:off x="685800" y="4343400"/>
-            <a:ext cx="5486399" cy="4114800"/>
+            <a:ext cx="5486400" cy="4114800"/>
           </a:xfrm>
           <a:prstGeom prst="rect">
             <a:avLst/>
@@ -1909,7 +1813,7 @@
           </a:bodyPr>
           <a:lstStyle/>
           <a:p>
-            <a:pPr lvl="0">
+            <a:pPr lvl="0" rtl="0">
               <a:spcBef>
                 <a:spcPts val="0"/>
               </a:spcBef>
@@ -1924,7 +1828,7 @@
       </p:sp>
       <p:sp>
         <p:nvSpPr>
-          <p:cNvPr id="131" name="Shape 131"/>
+          <p:cNvPr id="132" name="Shape 132"/>
           <p:cNvSpPr/>
           <p:nvPr>
             <p:ph idx="2" type="sldImg"/>
@@ -1933,7 +1837,7 @@
         <p:spPr>
           <a:xfrm>
             <a:off x="1143225" y="685800"/>
-            <a:ext cx="4572225" cy="3429000"/>
+            <a:ext cx="4572300" cy="3429000"/>
           </a:xfrm>
           <a:custGeom>
             <a:pathLst>
@@ -12780,7 +12684,7 @@
         </p:nvSpPr>
         <p:spPr>
           <a:xfrm>
-            <a:off x="468650" y="1013797"/>
+            <a:off x="457200" y="1161022"/>
             <a:ext cx="8229600" cy="4706100"/>
           </a:xfrm>
           <a:prstGeom prst="rect">
@@ -12815,7 +12719,7 @@
                 <a:cs typeface="Arial"/>
                 <a:sym typeface="Arial"/>
               </a:rPr>
-              <a:t>Criar o plano de gerenciamento do cronograma</a:t>
+              <a:t>Criar o plano de gerenciamento das aquisições</a:t>
             </a:r>
           </a:p>
           <a:p>
@@ -12840,7 +12744,7 @@
                 <a:cs typeface="Arial"/>
                 <a:sym typeface="Arial"/>
               </a:rPr>
-              <a:t>PMBOK: págs. 145 a 149</a:t>
+              <a:t>PMBOK: págs. 357 a 370</a:t>
             </a:r>
           </a:p>
           <a:p>
@@ -12865,7 +12769,79 @@
                 <a:cs typeface="Arial"/>
                 <a:sym typeface="Arial"/>
               </a:rPr>
-              <a:t>	Planejar o gerenciamento do cronograma é o processo de estabelecer as políticas, os procedimentos e a documentação para o planejamento, desenvolvimento, gerenciamento, execução e controle do cronograma do projeto. O principal benefício deste processo é o fornecimento de orientação e instruções sobre como o cronograma do projeto será gerenciado ao longo de todo o projeto. </a:t>
+              <a:t>	Planejar o gerenciamento da aquisições é o processo de documentação das decisões de compras do projeto, especificando a abordagem e identificando fornecedores em potencial. </a:t>
+            </a:r>
+          </a:p>
+          <a:p>
+            <a:pPr lvl="0" marL="0" rtl="0" algn="just">
+              <a:lnSpc>
+                <a:spcPct val="115000"/>
+              </a:lnSpc>
+              <a:spcBef>
+                <a:spcPts val="0"/>
+              </a:spcBef>
+              <a:buClr>
+                <a:schemeClr val="dk1"/>
+              </a:buClr>
+              <a:buSzPct val="68750"/>
+              <a:buFont typeface="Arial"/>
+              <a:buNone/>
+            </a:pPr>
+            <a:r>
+              <a:t/>
+            </a:r>
+            <a:endParaRPr b="0">
+              <a:latin typeface="Arial"/>
+              <a:ea typeface="Arial"/>
+              <a:cs typeface="Arial"/>
+              <a:sym typeface="Arial"/>
+            </a:endParaRPr>
+          </a:p>
+          <a:p>
+            <a:pPr lvl="0" marL="0" rtl="0" algn="just">
+              <a:lnSpc>
+                <a:spcPct val="115000"/>
+              </a:lnSpc>
+              <a:spcBef>
+                <a:spcPts val="0"/>
+              </a:spcBef>
+              <a:buClr>
+                <a:schemeClr val="dk1"/>
+              </a:buClr>
+              <a:buSzPct val="68750"/>
+              <a:buFont typeface="Arial"/>
+              <a:buNone/>
+            </a:pPr>
+            <a:r>
+              <a:rPr i="1" lang="pt-BR">
+                <a:latin typeface="Arial"/>
+                <a:ea typeface="Arial"/>
+                <a:cs typeface="Arial"/>
+                <a:sym typeface="Arial"/>
+              </a:rPr>
+              <a:t>Template:</a:t>
+            </a:r>
+            <a:r>
+              <a:rPr b="0" lang="pt-BR" sz="1100" u="sng">
+                <a:solidFill>
+                  <a:schemeClr val="hlink"/>
+                </a:solidFill>
+                <a:latin typeface="Arial"/>
+                <a:ea typeface="Arial"/>
+                <a:cs typeface="Arial"/>
+                <a:sym typeface="Arial"/>
+                <a:hlinkClick r:id="rId3"/>
+              </a:rPr>
+              <a:t>https://docs.google.com/viewer?url=http://www.inovagp.com/files/plano_de_gerenciamento_de_aquisicoes_inovagp.doc</a:t>
+            </a:r>
+            <a:r>
+              <a:rPr b="0" lang="pt-BR" sz="1100">
+                <a:latin typeface="Arial"/>
+                <a:ea typeface="Arial"/>
+                <a:cs typeface="Arial"/>
+                <a:sym typeface="Arial"/>
+              </a:rPr>
+              <a:t> </a:t>
             </a:r>
           </a:p>
           <a:p>
@@ -12912,7 +12888,7 @@
                 <a:cs typeface="Arial"/>
                 <a:sym typeface="Arial"/>
               </a:rPr>
-              <a:t>Criar o plano de gerenciamento de custos</a:t>
+              <a:t>Criar o plano de gerenciamento dos riscos</a:t>
             </a:r>
           </a:p>
           <a:p>
@@ -12937,7 +12913,7 @@
                 <a:cs typeface="Arial"/>
                 <a:sym typeface="Arial"/>
               </a:rPr>
-              <a:t>PMBOK: págs. 195 a 200</a:t>
+              <a:t>PMBOK: págs. 310 a 318</a:t>
             </a:r>
           </a:p>
           <a:p>
@@ -12962,7 +12938,79 @@
                 <a:cs typeface="Arial"/>
                 <a:sym typeface="Arial"/>
               </a:rPr>
-              <a:t>	Planejar o gerenciamento dos custos é o processo de estabelecer as políticas, os procedimentos e a documentação necessários para o planejamento, gerenciamento, despesas, e controle dos custos do projeto. O principal benefício deste processo é o fornecimento de orientação e instruções sobre como os custos do projeto serão gerenciados ao longo de todo o projeto. </a:t>
+              <a:t>	Planejar o gerenciamento dos riscos é o processo de definição de como conduzir as atividades de gerenciamento dos riscos de um projeto. Garante que o grau, tipo, e visibilidade do gerenciamento dos riscos sejam proporcionais tanto aos riscos quanto à importância do projeto para a organização. </a:t>
+            </a:r>
+          </a:p>
+          <a:p>
+            <a:pPr lvl="0" marL="0" rtl="0" algn="just">
+              <a:lnSpc>
+                <a:spcPct val="115000"/>
+              </a:lnSpc>
+              <a:spcBef>
+                <a:spcPts val="0"/>
+              </a:spcBef>
+              <a:buClr>
+                <a:schemeClr val="dk1"/>
+              </a:buClr>
+              <a:buSzPct val="68750"/>
+              <a:buFont typeface="Arial"/>
+              <a:buNone/>
+            </a:pPr>
+            <a:r>
+              <a:t/>
+            </a:r>
+            <a:endParaRPr b="0">
+              <a:latin typeface="Arial"/>
+              <a:ea typeface="Arial"/>
+              <a:cs typeface="Arial"/>
+              <a:sym typeface="Arial"/>
+            </a:endParaRPr>
+          </a:p>
+          <a:p>
+            <a:pPr lvl="0" marL="0" rtl="0" algn="just">
+              <a:lnSpc>
+                <a:spcPct val="115000"/>
+              </a:lnSpc>
+              <a:spcBef>
+                <a:spcPts val="0"/>
+              </a:spcBef>
+              <a:buClr>
+                <a:schemeClr val="dk1"/>
+              </a:buClr>
+              <a:buSzPct val="68750"/>
+              <a:buFont typeface="Arial"/>
+              <a:buNone/>
+            </a:pPr>
+            <a:r>
+              <a:rPr i="1" lang="pt-BR">
+                <a:latin typeface="Arial"/>
+                <a:ea typeface="Arial"/>
+                <a:cs typeface="Arial"/>
+                <a:sym typeface="Arial"/>
+              </a:rPr>
+              <a:t>Template:</a:t>
+            </a:r>
+            <a:r>
+              <a:rPr b="0" lang="pt-BR" sz="1100" u="sng">
+                <a:solidFill>
+                  <a:schemeClr val="hlink"/>
+                </a:solidFill>
+                <a:latin typeface="Arial"/>
+                <a:ea typeface="Arial"/>
+                <a:cs typeface="Arial"/>
+                <a:sym typeface="Arial"/>
+                <a:hlinkClick r:id="rId4"/>
+              </a:rPr>
+              <a:t>https://docs.google.com/viewer?url=http://www.inovagp.com/files/plano_de_gerenciamento_de_riscos_inovagp.doc</a:t>
+            </a:r>
+            <a:r>
+              <a:rPr b="0" lang="pt-BR" sz="1100">
+                <a:latin typeface="Arial"/>
+                <a:ea typeface="Arial"/>
+                <a:cs typeface="Arial"/>
+                <a:sym typeface="Arial"/>
+              </a:rPr>
+              <a:t>  </a:t>
             </a:r>
           </a:p>
         </p:txBody>
@@ -13090,7 +13138,7 @@
                 <a:cs typeface="Arial"/>
                 <a:sym typeface="Arial"/>
               </a:rPr>
-              <a:t>Criar o plano de gerenciamento das aquisições</a:t>
+              <a:t>Criar o plano de gerenciamento da qualidade</a:t>
             </a:r>
           </a:p>
           <a:p>
@@ -13115,7 +13163,7 @@
                 <a:cs typeface="Arial"/>
                 <a:sym typeface="Arial"/>
               </a:rPr>
-              <a:t>PMBOK: págs. 357 a 370</a:t>
+              <a:t>PMBOK: págs. 227 a 242</a:t>
             </a:r>
           </a:p>
           <a:p>
@@ -13140,7 +13188,7 @@
                 <a:cs typeface="Arial"/>
                 <a:sym typeface="Arial"/>
               </a:rPr>
-              <a:t>	Planejar o gerenciamento da aquisições é o processo de documentação das decisões de compras do projeto, especificando a abordagem e identificando fornecedores em potencial. O principal benefício deste processo é que ele determina se deve-se adquirir ou não apoio externo e, se for o caso, o que adquirir, como fazer a aquisição, a quantidade necessária, e quando efetuar a aquisição. </a:t>
+              <a:t>	Planejar o gerenciamento da qualidade é o processo de identificação dos requisitos e/ou padrões de qualidade do projeto e suas entregas, e de documentação de como o projeto demonstrará conformidade com os relevantes requisitos e/ou padrões de qualidade. </a:t>
             </a:r>
           </a:p>
           <a:p>
@@ -13169,25 +13217,50 @@
             </a:endParaRPr>
           </a:p>
           <a:p>
-            <a:pPr indent="-330200" lvl="0" marL="457200" rtl="0" algn="just">
+            <a:pPr lvl="0" marL="0" rtl="0" algn="just">
               <a:lnSpc>
                 <a:spcPct val="115000"/>
               </a:lnSpc>
               <a:spcBef>
                 <a:spcPts val="0"/>
               </a:spcBef>
-              <a:buSzPct val="100000"/>
+              <a:buClr>
+                <a:schemeClr val="dk1"/>
+              </a:buClr>
+              <a:buSzPct val="68750"/>
               <a:buFont typeface="Arial"/>
-              <a:buChar char="●"/>
+              <a:buNone/>
             </a:pPr>
             <a:r>
-              <a:rPr lang="pt-BR">
+              <a:rPr i="1" lang="pt-BR">
                 <a:latin typeface="Arial"/>
                 <a:ea typeface="Arial"/>
                 <a:cs typeface="Arial"/>
                 <a:sym typeface="Arial"/>
               </a:rPr>
-              <a:t>Criar o plano de gerenciamento dos riscos</a:t>
+              <a:t>Template:</a:t>
+            </a:r>
+            <a:r>
+              <a:rPr b="0" lang="pt-BR" sz="1100" u="sng">
+                <a:solidFill>
+                  <a:schemeClr val="hlink"/>
+                </a:solidFill>
+                <a:latin typeface="Arial"/>
+                <a:ea typeface="Arial"/>
+                <a:cs typeface="Arial"/>
+                <a:sym typeface="Arial"/>
+                <a:hlinkClick r:id="rId3"/>
+              </a:rPr>
+              <a:t>https://docs.google.com/viewer?url=http://www.inovagp.com/files/plano_de_gerenciamento_da_qualidade_inovagp.doc</a:t>
+            </a:r>
+            <a:r>
+              <a:rPr b="0" lang="pt-BR" sz="1100">
+                <a:latin typeface="Arial"/>
+                <a:ea typeface="Arial"/>
+                <a:cs typeface="Arial"/>
+                <a:sym typeface="Arial"/>
+              </a:rPr>
+              <a:t> </a:t>
             </a:r>
           </a:p>
           <a:p>
@@ -13206,39 +13279,14 @@
               <a:buNone/>
             </a:pPr>
             <a:r>
-              <a:rPr lang="pt-BR">
-                <a:latin typeface="Arial"/>
-                <a:ea typeface="Arial"/>
-                <a:cs typeface="Arial"/>
-                <a:sym typeface="Arial"/>
-              </a:rPr>
-              <a:t>PMBOK: págs. 310 a 318</a:t>
+              <a:t/>
             </a:r>
-          </a:p>
-          <a:p>
-            <a:pPr lvl="0" marL="0" rtl="0" algn="just">
-              <a:lnSpc>
-                <a:spcPct val="115000"/>
-              </a:lnSpc>
-              <a:spcBef>
-                <a:spcPts val="0"/>
-              </a:spcBef>
-              <a:buClr>
-                <a:schemeClr val="dk1"/>
-              </a:buClr>
-              <a:buSzPct val="68750"/>
-              <a:buFont typeface="Arial"/>
-              <a:buNone/>
-            </a:pPr>
-            <a:r>
-              <a:rPr b="0" lang="pt-BR">
-                <a:latin typeface="Arial"/>
-                <a:ea typeface="Arial"/>
-                <a:cs typeface="Arial"/>
-                <a:sym typeface="Arial"/>
-              </a:rPr>
-              <a:t>	Planejar o gerenciamento dos riscos é o processo de definição de como conduzir as atividades de gerenciamento dos riscos de um projeto. O principal benefício deste processo é que ele garante que o grau, tipo, e visibilidade do gerenciamento dos riscos sejam proporcionais tanto aos riscos quanto à importância do projeto para a organização. </a:t>
-            </a:r>
+            <a:endParaRPr>
+              <a:latin typeface="Arial"/>
+              <a:ea typeface="Arial"/>
+              <a:cs typeface="Arial"/>
+              <a:sym typeface="Arial"/>
+            </a:endParaRPr>
           </a:p>
         </p:txBody>
       </p:sp>
@@ -13278,209 +13326,6 @@
         <p:spPr>
           <a:xfrm>
             <a:off x="822959" y="365760"/>
-            <a:ext cx="7521000" cy="548700"/>
-          </a:xfrm>
-          <a:prstGeom prst="rect">
-            <a:avLst/>
-          </a:prstGeom>
-          <a:noFill/>
-          <a:ln>
-            <a:noFill/>
-          </a:ln>
-        </p:spPr>
-        <p:txBody>
-          <a:bodyPr anchorCtr="0" anchor="ctr" bIns="45700" lIns="91425" rIns="91425" tIns="45700">
-            <a:noAutofit/>
-          </a:bodyPr>
-          <a:lstStyle/>
-          <a:p>
-            <a:pPr indent="0" lvl="0" marL="0" marR="0" rtl="0" algn="l">
-              <a:spcBef>
-                <a:spcPts val="0"/>
-              </a:spcBef>
-              <a:buClr>
-                <a:schemeClr val="dk1"/>
-              </a:buClr>
-              <a:buSzPct val="25000"/>
-              <a:buFont typeface="Source Sans Pro"/>
-              <a:buNone/>
-            </a:pPr>
-            <a:r>
-              <a:rPr b="0" i="0" lang="pt-BR" sz="2800" u="none" cap="none" strike="noStrike">
-                <a:solidFill>
-                  <a:schemeClr val="dk1"/>
-                </a:solidFill>
-                <a:latin typeface="Source Sans Pro"/>
-                <a:ea typeface="Source Sans Pro"/>
-                <a:cs typeface="Source Sans Pro"/>
-                <a:sym typeface="Source Sans Pro"/>
-              </a:rPr>
-              <a:t>PLANEJAMENTO</a:t>
-            </a:r>
-          </a:p>
-        </p:txBody>
-      </p:sp>
-      <p:sp>
-        <p:nvSpPr>
-          <p:cNvPr id="165" name="Shape 165"/>
-          <p:cNvSpPr txBox="1"/>
-          <p:nvPr>
-            <p:ph idx="1" type="body"/>
-          </p:nvPr>
-        </p:nvSpPr>
-        <p:spPr>
-          <a:xfrm>
-            <a:off x="468650" y="1309397"/>
-            <a:ext cx="8229600" cy="4706100"/>
-          </a:xfrm>
-          <a:prstGeom prst="rect">
-            <a:avLst/>
-          </a:prstGeom>
-          <a:noFill/>
-          <a:ln>
-            <a:noFill/>
-          </a:ln>
-        </p:spPr>
-        <p:txBody>
-          <a:bodyPr anchorCtr="0" anchor="t" bIns="45700" lIns="91425" rIns="91425" tIns="45700">
-            <a:noAutofit/>
-          </a:bodyPr>
-          <a:lstStyle/>
-          <a:p>
-            <a:pPr indent="-330200" lvl="0" marL="457200" rtl="0" algn="just">
-              <a:lnSpc>
-                <a:spcPct val="115000"/>
-              </a:lnSpc>
-              <a:spcBef>
-                <a:spcPts val="0"/>
-              </a:spcBef>
-              <a:buSzPct val="100000"/>
-              <a:buFont typeface="Arial"/>
-              <a:buChar char="●"/>
-            </a:pPr>
-            <a:r>
-              <a:rPr lang="pt-BR">
-                <a:latin typeface="Arial"/>
-                <a:ea typeface="Arial"/>
-                <a:cs typeface="Arial"/>
-                <a:sym typeface="Arial"/>
-              </a:rPr>
-              <a:t>Criar o plano de gerenciamento da qualidade</a:t>
-            </a:r>
-          </a:p>
-          <a:p>
-            <a:pPr lvl="0" marL="0" rtl="0" algn="just">
-              <a:lnSpc>
-                <a:spcPct val="115000"/>
-              </a:lnSpc>
-              <a:spcBef>
-                <a:spcPts val="0"/>
-              </a:spcBef>
-              <a:buClr>
-                <a:schemeClr val="dk1"/>
-              </a:buClr>
-              <a:buSzPct val="68750"/>
-              <a:buFont typeface="Arial"/>
-              <a:buNone/>
-            </a:pPr>
-            <a:r>
-              <a:rPr lang="pt-BR">
-                <a:latin typeface="Arial"/>
-                <a:ea typeface="Arial"/>
-                <a:cs typeface="Arial"/>
-                <a:sym typeface="Arial"/>
-              </a:rPr>
-              <a:t>PMBOK: págs. 227 a 242</a:t>
-            </a:r>
-          </a:p>
-          <a:p>
-            <a:pPr lvl="0" marL="0" rtl="0" algn="just">
-              <a:lnSpc>
-                <a:spcPct val="115000"/>
-              </a:lnSpc>
-              <a:spcBef>
-                <a:spcPts val="0"/>
-              </a:spcBef>
-              <a:buClr>
-                <a:schemeClr val="dk1"/>
-              </a:buClr>
-              <a:buSzPct val="68750"/>
-              <a:buFont typeface="Arial"/>
-              <a:buNone/>
-            </a:pPr>
-            <a:r>
-              <a:rPr b="0" lang="pt-BR">
-                <a:latin typeface="Arial"/>
-                <a:ea typeface="Arial"/>
-                <a:cs typeface="Arial"/>
-                <a:sym typeface="Arial"/>
-              </a:rPr>
-              <a:t>	Planejar o gerenciamento da qualidade é o processo de identificação dos requisitos e/ou padrões de qualidade do projeto e suas entregas, e de documentação de como o projeto demonstrará conformidade com os relevantes requisitos e/ou padrões de qualidade. O principal benefício desse processo é o fornecimento de orientação e instruções sobre como a qualidade será gerenciada e validada ao longo de todo o projeto. </a:t>
-            </a:r>
-          </a:p>
-          <a:p>
-            <a:pPr lvl="0" marL="0" rtl="0" algn="just">
-              <a:lnSpc>
-                <a:spcPct val="115000"/>
-              </a:lnSpc>
-              <a:spcBef>
-                <a:spcPts val="0"/>
-              </a:spcBef>
-              <a:buClr>
-                <a:schemeClr val="dk1"/>
-              </a:buClr>
-              <a:buSzPct val="68750"/>
-              <a:buFont typeface="Arial"/>
-              <a:buNone/>
-            </a:pPr>
-            <a:r>
-              <a:t/>
-            </a:r>
-            <a:endParaRPr>
-              <a:latin typeface="Arial"/>
-              <a:ea typeface="Arial"/>
-              <a:cs typeface="Arial"/>
-              <a:sym typeface="Arial"/>
-            </a:endParaRPr>
-          </a:p>
-        </p:txBody>
-      </p:sp>
-    </p:spTree>
-  </p:cSld>
-  <p:clrMapOvr>
-    <a:masterClrMapping/>
-  </p:clrMapOvr>
-</p:sld>
-</file>
-
-<file path=ppt/slides/slide13.xml><?xml version="1.0" encoding="utf-8"?>
-<p:sld xmlns:a="http://schemas.openxmlformats.org/drawingml/2006/main" xmlns:r="http://schemas.openxmlformats.org/officeDocument/2006/relationships" xmlns:mc="http://schemas.openxmlformats.org/markup-compatibility/2006" xmlns:mv="urn:schemas-microsoft-com:mac:vml" xmlns:p="http://schemas.openxmlformats.org/presentationml/2006/main" xmlns:c="http://schemas.openxmlformats.org/drawingml/2006/chart" xmlns:dgm="http://schemas.openxmlformats.org/drawingml/2006/diagram" xmlns:o="urn:schemas-microsoft-com:office:office" xmlns:v="urn:schemas-microsoft-com:vml" xmlns:pvml="urn:schemas-microsoft-com:office:powerpoint" xmlns:com="http://schemas.openxmlformats.org/drawingml/2006/compatibility" xmlns:p14="http://schemas.microsoft.com/office/powerpoint/2010/main">
-  <p:cSld>
-    <p:spTree>
-      <p:nvGrpSpPr>
-        <p:cNvPr id="169" name="Shape 169"/>
-        <p:cNvGrpSpPr/>
-        <p:nvPr/>
-      </p:nvGrpSpPr>
-      <p:grpSpPr>
-        <a:xfrm>
-          <a:off x="0" y="0"/>
-          <a:ext cx="0" cy="0"/>
-          <a:chOff x="0" y="0"/>
-          <a:chExt cx="0" cy="0"/>
-        </a:xfrm>
-      </p:grpSpPr>
-      <p:sp>
-        <p:nvSpPr>
-          <p:cNvPr id="170" name="Shape 170"/>
-          <p:cNvSpPr txBox="1"/>
-          <p:nvPr>
-            <p:ph type="title"/>
-          </p:nvPr>
-        </p:nvSpPr>
-        <p:spPr>
-          <a:xfrm>
-            <a:off x="822959" y="365760"/>
             <a:ext cx="7520939" cy="548639"/>
           </a:xfrm>
           <a:prstGeom prst="rect">
@@ -13525,7 +13370,7 @@
       </p:sp>
       <p:sp>
         <p:nvSpPr>
-          <p:cNvPr id="171" name="Shape 171"/>
+          <p:cNvPr id="165" name="Shape 165"/>
           <p:cNvSpPr txBox="1"/>
           <p:nvPr>
             <p:ph idx="1" type="body"/>
@@ -13618,14 +13463,14 @@
                 <a:cs typeface="Arial"/>
                 <a:sym typeface="Arial"/>
               </a:rPr>
-              <a:t>	Executar o cronograma é uma atividade da disciplina onde não possui uma atividade equivalente no PMBOK. Essa atividade engloba a execução das atividades, no qual está sendo executado todas as atividades previstas no cronograma.. </a:t>
+              <a:t>	Executar o cronograma é uma atividade da disciplina onde não possui uma atividade equivalente no PMBOK. Essa atividade engloba a execução das atividades, no qual está sendo executado todas as atividades previstas no cronograma.</a:t>
             </a:r>
           </a:p>
         </p:txBody>
       </p:sp>
       <p:pic>
         <p:nvPicPr>
-          <p:cNvPr descr="execucao_pmbok.png" id="172" name="Shape 172"/>
+          <p:cNvPr descr="execucao_pmbok.png" id="166" name="Shape 166"/>
           <p:cNvPicPr preferRelativeResize="0"/>
           <p:nvPr/>
         </p:nvPicPr>
@@ -13641,6 +13486,111 @@
           <a:xfrm>
             <a:off x="0" y="1116419"/>
             <a:ext cx="9144000" cy="1689811"/>
+          </a:xfrm>
+          <a:prstGeom prst="rect">
+            <a:avLst/>
+          </a:prstGeom>
+          <a:noFill/>
+          <a:ln>
+            <a:noFill/>
+          </a:ln>
+        </p:spPr>
+      </p:pic>
+    </p:spTree>
+  </p:cSld>
+  <p:clrMapOvr>
+    <a:masterClrMapping/>
+  </p:clrMapOvr>
+</p:sld>
+</file>
+
+<file path=ppt/slides/slide13.xml><?xml version="1.0" encoding="utf-8"?>
+<p:sld xmlns:a="http://schemas.openxmlformats.org/drawingml/2006/main" xmlns:r="http://schemas.openxmlformats.org/officeDocument/2006/relationships" xmlns:mc="http://schemas.openxmlformats.org/markup-compatibility/2006" xmlns:mv="urn:schemas-microsoft-com:mac:vml" xmlns:p="http://schemas.openxmlformats.org/presentationml/2006/main" xmlns:c="http://schemas.openxmlformats.org/drawingml/2006/chart" xmlns:dgm="http://schemas.openxmlformats.org/drawingml/2006/diagram" xmlns:o="urn:schemas-microsoft-com:office:office" xmlns:v="urn:schemas-microsoft-com:vml" xmlns:pvml="urn:schemas-microsoft-com:office:powerpoint" xmlns:com="http://schemas.openxmlformats.org/drawingml/2006/compatibility" xmlns:p14="http://schemas.microsoft.com/office/powerpoint/2010/main">
+  <p:cSld>
+    <p:spTree>
+      <p:nvGrpSpPr>
+        <p:cNvPr id="170" name="Shape 170"/>
+        <p:cNvGrpSpPr/>
+        <p:nvPr/>
+      </p:nvGrpSpPr>
+      <p:grpSpPr>
+        <a:xfrm>
+          <a:off x="0" y="0"/>
+          <a:ext cx="0" cy="0"/>
+          <a:chOff x="0" y="0"/>
+          <a:chExt cx="0" cy="0"/>
+        </a:xfrm>
+      </p:grpSpPr>
+      <p:sp>
+        <p:nvSpPr>
+          <p:cNvPr id="171" name="Shape 171"/>
+          <p:cNvSpPr txBox="1"/>
+          <p:nvPr>
+            <p:ph type="title"/>
+          </p:nvPr>
+        </p:nvSpPr>
+        <p:spPr>
+          <a:xfrm>
+            <a:off x="822959" y="365760"/>
+            <a:ext cx="7520939" cy="548639"/>
+          </a:xfrm>
+          <a:prstGeom prst="rect">
+            <a:avLst/>
+          </a:prstGeom>
+          <a:noFill/>
+          <a:ln>
+            <a:noFill/>
+          </a:ln>
+        </p:spPr>
+        <p:txBody>
+          <a:bodyPr anchorCtr="0" anchor="ctr" bIns="45700" lIns="91425" rIns="91425" tIns="45700">
+            <a:noAutofit/>
+          </a:bodyPr>
+          <a:lstStyle/>
+          <a:p>
+            <a:pPr indent="0" lvl="0" marL="0" marR="0" rtl="0" algn="l">
+              <a:spcBef>
+                <a:spcPts val="0"/>
+              </a:spcBef>
+              <a:buClr>
+                <a:schemeClr val="dk1"/>
+              </a:buClr>
+              <a:buSzPct val="25000"/>
+              <a:buFont typeface="Source Sans Pro"/>
+              <a:buNone/>
+            </a:pPr>
+            <a:r>
+              <a:rPr b="0" i="0" lang="pt-BR" sz="2800" u="none" cap="none" strike="noStrike">
+                <a:solidFill>
+                  <a:schemeClr val="dk1"/>
+                </a:solidFill>
+                <a:latin typeface="Source Sans Pro"/>
+                <a:ea typeface="Source Sans Pro"/>
+                <a:cs typeface="Source Sans Pro"/>
+                <a:sym typeface="Source Sans Pro"/>
+              </a:rPr>
+              <a:t>MONITORAMENTO E CONTROLE</a:t>
+            </a:r>
+          </a:p>
+        </p:txBody>
+      </p:sp>
+      <p:pic>
+        <p:nvPicPr>
+          <p:cNvPr id="172" name="Shape 172"/>
+          <p:cNvPicPr preferRelativeResize="0"/>
+          <p:nvPr/>
+        </p:nvPicPr>
+        <p:blipFill rotWithShape="1">
+          <a:blip r:embed="rId3">
+            <a:alphaModFix/>
+          </a:blip>
+          <a:srcRect b="0" l="0" r="0" t="0"/>
+          <a:stretch/>
+        </p:blipFill>
+        <p:spPr>
+          <a:xfrm>
+            <a:off x="149425" y="1880825"/>
+            <a:ext cx="8868000" cy="2652600"/>
           </a:xfrm>
           <a:prstGeom prst="rect">
             <a:avLst/>
@@ -13729,23 +13679,18 @@
           </a:p>
         </p:txBody>
       </p:sp>
-      <p:pic>
-        <p:nvPicPr>
+      <p:sp>
+        <p:nvSpPr>
           <p:cNvPr id="178" name="Shape 178"/>
-          <p:cNvPicPr preferRelativeResize="0"/>
-          <p:nvPr/>
-        </p:nvPicPr>
-        <p:blipFill rotWithShape="1">
-          <a:blip r:embed="rId3">
-            <a:alphaModFix/>
-          </a:blip>
-          <a:srcRect b="0" l="0" r="0" t="0"/>
-          <a:stretch/>
-        </p:blipFill>
+          <p:cNvSpPr txBox="1"/>
+          <p:nvPr>
+            <p:ph idx="1" type="body"/>
+          </p:nvPr>
+        </p:nvSpPr>
         <p:spPr>
           <a:xfrm>
-            <a:off x="275849" y="1518149"/>
-            <a:ext cx="8592300" cy="3180000"/>
+            <a:off x="336300" y="1330225"/>
+            <a:ext cx="8471400" cy="4419300"/>
           </a:xfrm>
           <a:prstGeom prst="rect">
             <a:avLst/>
@@ -13755,7 +13700,230 @@
             <a:noFill/>
           </a:ln>
         </p:spPr>
-      </p:pic>
+        <p:txBody>
+          <a:bodyPr anchorCtr="0" anchor="t" bIns="45700" lIns="91425" rIns="91425" tIns="45700">
+            <a:noAutofit/>
+          </a:bodyPr>
+          <a:lstStyle/>
+          <a:p>
+            <a:pPr indent="-228600" lvl="0" marL="457200" rtl="0" algn="just">
+              <a:lnSpc>
+                <a:spcPct val="115000"/>
+              </a:lnSpc>
+              <a:spcBef>
+                <a:spcPts val="0"/>
+              </a:spcBef>
+              <a:buChar char="●"/>
+            </a:pPr>
+            <a:r>
+              <a:rPr lang="pt-BR">
+                <a:latin typeface="Arial"/>
+                <a:ea typeface="Arial"/>
+                <a:cs typeface="Arial"/>
+                <a:sym typeface="Arial"/>
+              </a:rPr>
+              <a:t>Validar o escopo</a:t>
+            </a:r>
+          </a:p>
+          <a:p>
+            <a:pPr lvl="0" marL="0" rtl="0" algn="just">
+              <a:lnSpc>
+                <a:spcPct val="115000"/>
+              </a:lnSpc>
+              <a:spcBef>
+                <a:spcPts val="0"/>
+              </a:spcBef>
+              <a:buClr>
+                <a:schemeClr val="dk1"/>
+              </a:buClr>
+              <a:buSzPct val="68750"/>
+              <a:buFont typeface="Arial"/>
+              <a:buNone/>
+            </a:pPr>
+            <a:r>
+              <a:rPr lang="pt-BR">
+                <a:latin typeface="Arial"/>
+                <a:ea typeface="Arial"/>
+                <a:cs typeface="Arial"/>
+                <a:sym typeface="Arial"/>
+              </a:rPr>
+              <a:t>PMBOK: págs. 133 a 136</a:t>
+            </a:r>
+          </a:p>
+          <a:p>
+            <a:pPr lvl="0" marL="0" rtl="0" algn="just">
+              <a:lnSpc>
+                <a:spcPct val="115000"/>
+              </a:lnSpc>
+              <a:spcBef>
+                <a:spcPts val="0"/>
+              </a:spcBef>
+              <a:buClr>
+                <a:schemeClr val="dk1"/>
+              </a:buClr>
+              <a:buSzPct val="68750"/>
+              <a:buFont typeface="Arial"/>
+              <a:buNone/>
+            </a:pPr>
+            <a:r>
+              <a:rPr b="0" lang="pt-BR">
+                <a:latin typeface="Arial"/>
+                <a:ea typeface="Arial"/>
+                <a:cs typeface="Arial"/>
+                <a:sym typeface="Arial"/>
+              </a:rPr>
+              <a:t>	Validar o escopo é o processo de formalização da aceitação das entregas concluídas do projeto. Proporcionar objetividade ao processo de aceitação e aumenta a probabilidade da aceitação final do produto, serviço ou resultado, através da validação de cada entrega. </a:t>
+            </a:r>
+          </a:p>
+          <a:p>
+            <a:pPr lvl="0" marL="0" rtl="0" algn="just">
+              <a:lnSpc>
+                <a:spcPct val="115000"/>
+              </a:lnSpc>
+              <a:spcBef>
+                <a:spcPts val="0"/>
+              </a:spcBef>
+              <a:buClr>
+                <a:schemeClr val="dk1"/>
+              </a:buClr>
+              <a:buSzPct val="68750"/>
+              <a:buFont typeface="Arial"/>
+              <a:buNone/>
+            </a:pPr>
+            <a:r>
+              <a:t/>
+            </a:r>
+            <a:endParaRPr b="0">
+              <a:latin typeface="Arial"/>
+              <a:ea typeface="Arial"/>
+              <a:cs typeface="Arial"/>
+              <a:sym typeface="Arial"/>
+            </a:endParaRPr>
+          </a:p>
+          <a:p>
+            <a:pPr lvl="0" marL="0" rtl="0" algn="just">
+              <a:lnSpc>
+                <a:spcPct val="115000"/>
+              </a:lnSpc>
+              <a:spcBef>
+                <a:spcPts val="0"/>
+              </a:spcBef>
+              <a:buClr>
+                <a:schemeClr val="dk1"/>
+              </a:buClr>
+              <a:buSzPct val="68750"/>
+              <a:buFont typeface="Arial"/>
+              <a:buNone/>
+            </a:pPr>
+            <a:r>
+              <a:t/>
+            </a:r>
+            <a:endParaRPr b="0">
+              <a:latin typeface="Arial"/>
+              <a:ea typeface="Arial"/>
+              <a:cs typeface="Arial"/>
+              <a:sym typeface="Arial"/>
+            </a:endParaRPr>
+          </a:p>
+          <a:p>
+            <a:pPr lvl="0" marL="0" rtl="0" algn="just">
+              <a:lnSpc>
+                <a:spcPct val="115000"/>
+              </a:lnSpc>
+              <a:spcBef>
+                <a:spcPts val="0"/>
+              </a:spcBef>
+              <a:buClr>
+                <a:schemeClr val="dk1"/>
+              </a:buClr>
+              <a:buSzPct val="68750"/>
+              <a:buFont typeface="Arial"/>
+              <a:buNone/>
+            </a:pPr>
+            <a:r>
+              <a:t/>
+            </a:r>
+            <a:endParaRPr b="0">
+              <a:latin typeface="Arial"/>
+              <a:ea typeface="Arial"/>
+              <a:cs typeface="Arial"/>
+              <a:sym typeface="Arial"/>
+            </a:endParaRPr>
+          </a:p>
+          <a:p>
+            <a:pPr indent="-330200" lvl="0" marL="457200" rtl="0" algn="just">
+              <a:lnSpc>
+                <a:spcPct val="115000"/>
+              </a:lnSpc>
+              <a:spcBef>
+                <a:spcPts val="0"/>
+              </a:spcBef>
+              <a:buSzPct val="100000"/>
+              <a:buFont typeface="Arial"/>
+              <a:buChar char="●"/>
+            </a:pPr>
+            <a:r>
+              <a:rPr lang="pt-BR">
+                <a:latin typeface="Arial"/>
+                <a:ea typeface="Arial"/>
+                <a:cs typeface="Arial"/>
+                <a:sym typeface="Arial"/>
+              </a:rPr>
+              <a:t>Controlar Escopo</a:t>
+            </a:r>
+          </a:p>
+          <a:p>
+            <a:pPr lvl="0" marL="0" rtl="0" algn="just">
+              <a:lnSpc>
+                <a:spcPct val="115000"/>
+              </a:lnSpc>
+              <a:spcBef>
+                <a:spcPts val="0"/>
+              </a:spcBef>
+              <a:buClr>
+                <a:schemeClr val="dk1"/>
+              </a:buClr>
+              <a:buSzPct val="68750"/>
+              <a:buFont typeface="Arial"/>
+              <a:buNone/>
+            </a:pPr>
+            <a:r>
+              <a:rPr lang="pt-BR">
+                <a:latin typeface="Arial"/>
+                <a:ea typeface="Arial"/>
+                <a:cs typeface="Arial"/>
+                <a:sym typeface="Arial"/>
+              </a:rPr>
+              <a:t>PMBOK: págs. 136 a 140</a:t>
+            </a:r>
+          </a:p>
+          <a:p>
+            <a:pPr lvl="0" marL="0" rtl="0" algn="just">
+              <a:lnSpc>
+                <a:spcPct val="115000"/>
+              </a:lnSpc>
+              <a:spcBef>
+                <a:spcPts val="0"/>
+              </a:spcBef>
+              <a:buClr>
+                <a:schemeClr val="dk1"/>
+              </a:buClr>
+              <a:buSzPct val="68750"/>
+              <a:buFont typeface="Arial"/>
+              <a:buNone/>
+            </a:pPr>
+            <a:r>
+              <a:rPr b="0" lang="pt-BR">
+                <a:latin typeface="Arial"/>
+                <a:ea typeface="Arial"/>
+                <a:cs typeface="Arial"/>
+                <a:sym typeface="Arial"/>
+              </a:rPr>
+              <a:t>	Controlar o escopo é o processo de monitoramento do progresso do escopo do projeto e do escopo do produto e gerenciamento das mudanças feitas na linha de base do escopo. Permitir que a linha de base do escopo seja mantida ao longo de todo o projeto. </a:t>
+            </a:r>
+          </a:p>
+        </p:txBody>
+      </p:sp>
     </p:spTree>
   </p:cSld>
   <p:clrMapOvr>
@@ -13792,7 +13960,7 @@
         <p:spPr>
           <a:xfrm>
             <a:off x="822959" y="365760"/>
-            <a:ext cx="7520939" cy="548639"/>
+            <a:ext cx="7521000" cy="548700"/>
           </a:xfrm>
           <a:prstGeom prst="rect">
             <a:avLst/>
@@ -13861,13 +14029,15 @@
           </a:bodyPr>
           <a:lstStyle/>
           <a:p>
-            <a:pPr indent="-228600" lvl="0" marL="457200" rtl="0" algn="just">
+            <a:pPr indent="-330200" lvl="0" marL="457200" rtl="0" algn="just">
               <a:lnSpc>
                 <a:spcPct val="115000"/>
               </a:lnSpc>
               <a:spcBef>
                 <a:spcPts val="0"/>
               </a:spcBef>
+              <a:buSzPct val="100000"/>
+              <a:buFont typeface="Arial"/>
               <a:buChar char="●"/>
             </a:pPr>
             <a:r>
@@ -13877,7 +14047,7 @@
                 <a:cs typeface="Arial"/>
                 <a:sym typeface="Arial"/>
               </a:rPr>
-              <a:t>Validar o escopo</a:t>
+              <a:t>Controlar cronograma</a:t>
             </a:r>
           </a:p>
           <a:p>
@@ -13902,7 +14072,7 @@
                 <a:cs typeface="Arial"/>
                 <a:sym typeface="Arial"/>
               </a:rPr>
-              <a:t>PMBOK: págs. 133 a 136</a:t>
+              <a:t>PMBOK: págs. 185 a 192</a:t>
             </a:r>
           </a:p>
           <a:p>
@@ -13927,7 +14097,7 @@
                 <a:cs typeface="Arial"/>
                 <a:sym typeface="Arial"/>
               </a:rPr>
-              <a:t>	Validar o escopo é o processo de formalização da aceitação das entregas concluídas do projeto. O principal benefício deste processo é que ele proporciona objetividade ao processo de aceitação e aumenta a probabilidade da aceitação final do produto, serviço ou resultado, através da validação de cada entrega. </a:t>
+              <a:t>	Controlar o cronograma é o processo de monitoramento do andamento das atividades do projeto para atualização no seu progresso e gerenciamento das mudanças feitas na linha de base do cronograma para realizar o planejado. Proporciona o reconhecimento do desvio do planejado e a tomada de decisões corretivas e preventivas</a:t>
             </a:r>
           </a:p>
           <a:p>
@@ -13956,16 +14126,44 @@
             </a:endParaRPr>
           </a:p>
           <a:p>
-            <a:pPr indent="-330200" lvl="0" marL="457200" rtl="0" algn="just">
+            <a:pPr lvl="0" marL="0" rtl="0" algn="just">
               <a:lnSpc>
                 <a:spcPct val="115000"/>
               </a:lnSpc>
               <a:spcBef>
                 <a:spcPts val="0"/>
               </a:spcBef>
-              <a:buSzPct val="100000"/>
+              <a:buClr>
+                <a:schemeClr val="dk1"/>
+              </a:buClr>
+              <a:buSzPct val="68750"/>
               <a:buFont typeface="Arial"/>
-              <a:buChar char="●"/>
+              <a:buNone/>
+            </a:pPr>
+            <a:r>
+              <a:t/>
+            </a:r>
+            <a:endParaRPr b="0">
+              <a:latin typeface="Arial"/>
+              <a:ea typeface="Arial"/>
+              <a:cs typeface="Arial"/>
+              <a:sym typeface="Arial"/>
+            </a:endParaRPr>
+          </a:p>
+          <a:p>
+            <a:pPr lvl="0" marL="0" rtl="0" algn="just">
+              <a:lnSpc>
+                <a:spcPct val="115000"/>
+              </a:lnSpc>
+              <a:spcBef>
+                <a:spcPts val="0"/>
+              </a:spcBef>
+              <a:buClr>
+                <a:schemeClr val="dk1"/>
+              </a:buClr>
+              <a:buSzPct val="68750"/>
+              <a:buFont typeface="Arial"/>
+              <a:buNone/>
             </a:pPr>
             <a:r>
               <a:rPr lang="pt-BR">
@@ -13974,7 +14172,7 @@
                 <a:cs typeface="Arial"/>
                 <a:sym typeface="Arial"/>
               </a:rPr>
-              <a:t>Controlar Escopo</a:t>
+              <a:t>Controlar custos</a:t>
             </a:r>
           </a:p>
           <a:p>
@@ -13999,7 +14197,7 @@
                 <a:cs typeface="Arial"/>
                 <a:sym typeface="Arial"/>
               </a:rPr>
-              <a:t>PMBOK: págs. 136 a 140</a:t>
+              <a:t>PMBOK: págs. 215 a 226</a:t>
             </a:r>
           </a:p>
           <a:p>
@@ -14024,7 +14222,7 @@
                 <a:cs typeface="Arial"/>
                 <a:sym typeface="Arial"/>
               </a:rPr>
-              <a:t>	Controlar o escopo é o processo de monitoramento do progresso do escopo do projeto e do escopo do produto e gerenciamento das mudanças feitas na linha de base do escopo. O principal benefício deste processo é permitir que a linha de base do escopo seja mantida ao longo de todo o projeto. </a:t>
+              <a:t>	Controlar os custos é o processo de monitoramento do andamento do projeto para atualização no seu orçamento e gerenciamento das mudanças feitas na linha de base de custos, fornecendo os meios de reconhecer a variação do planejado a fim de tomar decisões corretivas e preventivas.</a:t>
             </a:r>
           </a:p>
         </p:txBody>
@@ -14152,7 +14350,7 @@
                 <a:cs typeface="Arial"/>
                 <a:sym typeface="Arial"/>
               </a:rPr>
-              <a:t>Controlar cronograma</a:t>
+              <a:t>Controlar riscos</a:t>
             </a:r>
           </a:p>
           <a:p>
@@ -14177,7 +14375,7 @@
                 <a:cs typeface="Arial"/>
                 <a:sym typeface="Arial"/>
               </a:rPr>
-              <a:t>PMBOK: págs. 185 a 192</a:t>
+              <a:t>PMBOK: págs. 349 a 354</a:t>
             </a:r>
           </a:p>
           <a:p>
@@ -14202,104 +14400,7 @@
                 <a:cs typeface="Arial"/>
                 <a:sym typeface="Arial"/>
               </a:rPr>
-              <a:t>	Controlar o cronograma é o processo de monitoramento do andamento das atividades do projeto para atualização no seu progresso e gerenciamento das mudanças feitas na linha de base do cronograma para realizar o planejado. O principal benefício deste processo é fornecer os meios de se reconhecer o desvio do planejado e tomar medidas corretivas e preventivas, minimizando assim o risco. </a:t>
-            </a:r>
-          </a:p>
-          <a:p>
-            <a:pPr lvl="0" marL="0" rtl="0" algn="just">
-              <a:lnSpc>
-                <a:spcPct val="115000"/>
-              </a:lnSpc>
-              <a:spcBef>
-                <a:spcPts val="0"/>
-              </a:spcBef>
-              <a:buClr>
-                <a:schemeClr val="dk1"/>
-              </a:buClr>
-              <a:buSzPct val="68750"/>
-              <a:buFont typeface="Arial"/>
-              <a:buNone/>
-            </a:pPr>
-            <a:r>
-              <a:t/>
-            </a:r>
-            <a:endParaRPr b="0">
-              <a:latin typeface="Arial"/>
-              <a:ea typeface="Arial"/>
-              <a:cs typeface="Arial"/>
-              <a:sym typeface="Arial"/>
-            </a:endParaRPr>
-          </a:p>
-          <a:p>
-            <a:pPr indent="-330200" lvl="0" marL="457200" rtl="0" algn="just">
-              <a:lnSpc>
-                <a:spcPct val="115000"/>
-              </a:lnSpc>
-              <a:spcBef>
-                <a:spcPts val="0"/>
-              </a:spcBef>
-              <a:buSzPct val="100000"/>
-              <a:buFont typeface="Arial"/>
-              <a:buChar char="●"/>
-            </a:pPr>
-            <a:r>
-              <a:rPr lang="pt-BR">
-                <a:latin typeface="Arial"/>
-                <a:ea typeface="Arial"/>
-                <a:cs typeface="Arial"/>
-                <a:sym typeface="Arial"/>
-              </a:rPr>
-              <a:t>Controlar custos</a:t>
-            </a:r>
-          </a:p>
-          <a:p>
-            <a:pPr lvl="0" marL="0" rtl="0" algn="just">
-              <a:lnSpc>
-                <a:spcPct val="115000"/>
-              </a:lnSpc>
-              <a:spcBef>
-                <a:spcPts val="0"/>
-              </a:spcBef>
-              <a:buClr>
-                <a:schemeClr val="dk1"/>
-              </a:buClr>
-              <a:buSzPct val="68750"/>
-              <a:buFont typeface="Arial"/>
-              <a:buNone/>
-            </a:pPr>
-            <a:r>
-              <a:rPr lang="pt-BR">
-                <a:latin typeface="Arial"/>
-                <a:ea typeface="Arial"/>
-                <a:cs typeface="Arial"/>
-                <a:sym typeface="Arial"/>
-              </a:rPr>
-              <a:t>PMBOK: págs. 215 a 226</a:t>
-            </a:r>
-          </a:p>
-          <a:p>
-            <a:pPr lvl="0" marL="0" rtl="0" algn="just">
-              <a:lnSpc>
-                <a:spcPct val="115000"/>
-              </a:lnSpc>
-              <a:spcBef>
-                <a:spcPts val="0"/>
-              </a:spcBef>
-              <a:buClr>
-                <a:schemeClr val="dk1"/>
-              </a:buClr>
-              <a:buSzPct val="68750"/>
-              <a:buFont typeface="Arial"/>
-              <a:buNone/>
-            </a:pPr>
-            <a:r>
-              <a:rPr b="0" lang="pt-BR">
-                <a:latin typeface="Arial"/>
-                <a:ea typeface="Arial"/>
-                <a:cs typeface="Arial"/>
-                <a:sym typeface="Arial"/>
-              </a:rPr>
-              <a:t>	Controlar os custos é o processo de monitoramento do andamento do projeto para atualização no seu orçamento e gerenciamento das mudanças feitas na linha de base de custos. O principal benefício deste processo é fornecer os meios de se reconhecer a variação do planejado a fim de tomar medidas corretivas e preventivas, minimizando assim o risco.</a:t>
+              <a:t>	Controlar os riscos é o processo de implementação de planos de respostas aos riscos, acompanhamento dos riscos identificados, monitoramento dos riscos residuais, identificação de novos riscos e avaliação da eficácia do processo de riscos durante todo o projeto. Proporciona a melhoria do grau de eficiência da abordagem dos riscos no decorrer de todo o ciclo de vida do projeto a fim de otimizar continuamente as respostas aos riscos.</a:t>
             </a:r>
           </a:p>
         </p:txBody>
@@ -14340,184 +14441,6 @@
         <p:spPr>
           <a:xfrm>
             <a:off x="822959" y="365760"/>
-            <a:ext cx="7521000" cy="548700"/>
-          </a:xfrm>
-          <a:prstGeom prst="rect">
-            <a:avLst/>
-          </a:prstGeom>
-          <a:noFill/>
-          <a:ln>
-            <a:noFill/>
-          </a:ln>
-        </p:spPr>
-        <p:txBody>
-          <a:bodyPr anchorCtr="0" anchor="ctr" bIns="45700" lIns="91425" rIns="91425" tIns="45700">
-            <a:noAutofit/>
-          </a:bodyPr>
-          <a:lstStyle/>
-          <a:p>
-            <a:pPr indent="0" lvl="0" marL="0" marR="0" rtl="0" algn="l">
-              <a:spcBef>
-                <a:spcPts val="0"/>
-              </a:spcBef>
-              <a:buClr>
-                <a:schemeClr val="dk1"/>
-              </a:buClr>
-              <a:buSzPct val="25000"/>
-              <a:buFont typeface="Source Sans Pro"/>
-              <a:buNone/>
-            </a:pPr>
-            <a:r>
-              <a:rPr b="0" i="0" lang="pt-BR" sz="2800" u="none" cap="none" strike="noStrike">
-                <a:solidFill>
-                  <a:schemeClr val="dk1"/>
-                </a:solidFill>
-                <a:latin typeface="Source Sans Pro"/>
-                <a:ea typeface="Source Sans Pro"/>
-                <a:cs typeface="Source Sans Pro"/>
-                <a:sym typeface="Source Sans Pro"/>
-              </a:rPr>
-              <a:t>MONITORAMENTO E CONTROLE</a:t>
-            </a:r>
-          </a:p>
-        </p:txBody>
-      </p:sp>
-      <p:sp>
-        <p:nvSpPr>
-          <p:cNvPr id="196" name="Shape 196"/>
-          <p:cNvSpPr txBox="1"/>
-          <p:nvPr>
-            <p:ph idx="1" type="body"/>
-          </p:nvPr>
-        </p:nvSpPr>
-        <p:spPr>
-          <a:xfrm>
-            <a:off x="336300" y="1330225"/>
-            <a:ext cx="8471400" cy="4419300"/>
-          </a:xfrm>
-          <a:prstGeom prst="rect">
-            <a:avLst/>
-          </a:prstGeom>
-          <a:noFill/>
-          <a:ln>
-            <a:noFill/>
-          </a:ln>
-        </p:spPr>
-        <p:txBody>
-          <a:bodyPr anchorCtr="0" anchor="t" bIns="45700" lIns="91425" rIns="91425" tIns="45700">
-            <a:noAutofit/>
-          </a:bodyPr>
-          <a:lstStyle/>
-          <a:p>
-            <a:pPr indent="-330200" lvl="0" marL="457200" rtl="0" algn="just">
-              <a:lnSpc>
-                <a:spcPct val="115000"/>
-              </a:lnSpc>
-              <a:spcBef>
-                <a:spcPts val="0"/>
-              </a:spcBef>
-              <a:buSzPct val="100000"/>
-              <a:buFont typeface="Arial"/>
-              <a:buChar char="●"/>
-            </a:pPr>
-            <a:r>
-              <a:rPr lang="pt-BR">
-                <a:latin typeface="Arial"/>
-                <a:ea typeface="Arial"/>
-                <a:cs typeface="Arial"/>
-                <a:sym typeface="Arial"/>
-              </a:rPr>
-              <a:t>Controlar riscos</a:t>
-            </a:r>
-          </a:p>
-          <a:p>
-            <a:pPr lvl="0" marL="0" rtl="0" algn="just">
-              <a:lnSpc>
-                <a:spcPct val="115000"/>
-              </a:lnSpc>
-              <a:spcBef>
-                <a:spcPts val="0"/>
-              </a:spcBef>
-              <a:buClr>
-                <a:schemeClr val="dk1"/>
-              </a:buClr>
-              <a:buSzPct val="68750"/>
-              <a:buFont typeface="Arial"/>
-              <a:buNone/>
-            </a:pPr>
-            <a:r>
-              <a:rPr lang="pt-BR">
-                <a:latin typeface="Arial"/>
-                <a:ea typeface="Arial"/>
-                <a:cs typeface="Arial"/>
-                <a:sym typeface="Arial"/>
-              </a:rPr>
-              <a:t>PMBOK: págs. 349 a 354</a:t>
-            </a:r>
-          </a:p>
-          <a:p>
-            <a:pPr lvl="0" marL="0" rtl="0" algn="just">
-              <a:lnSpc>
-                <a:spcPct val="115000"/>
-              </a:lnSpc>
-              <a:spcBef>
-                <a:spcPts val="0"/>
-              </a:spcBef>
-              <a:buClr>
-                <a:schemeClr val="dk1"/>
-              </a:buClr>
-              <a:buSzPct val="68750"/>
-              <a:buFont typeface="Arial"/>
-              <a:buNone/>
-            </a:pPr>
-            <a:r>
-              <a:rPr b="0" lang="pt-BR">
-                <a:latin typeface="Arial"/>
-                <a:ea typeface="Arial"/>
-                <a:cs typeface="Arial"/>
-                <a:sym typeface="Arial"/>
-              </a:rPr>
-              <a:t>	Controlar os riscos é o processo de implementação de planos de respostas aos riscos, acompanhamento dos riscos identificados, monitoramento dos riscos residuais, identificação de novos riscos e avaliação da eficácia do processo de riscos durante todo o projeto. O principal benefício desse processo é a melhoria do grau de eficiência da abordagem dos riscos no decorrer de todo o ciclo de vida do projeto a fim de otimizar continuamente as respostas aos riscos.</a:t>
-            </a:r>
-          </a:p>
-        </p:txBody>
-      </p:sp>
-    </p:spTree>
-  </p:cSld>
-  <p:clrMapOvr>
-    <a:masterClrMapping/>
-  </p:clrMapOvr>
-</p:sld>
-</file>
-
-<file path=ppt/slides/slide18.xml><?xml version="1.0" encoding="utf-8"?>
-<p:sld xmlns:a="http://schemas.openxmlformats.org/drawingml/2006/main" xmlns:r="http://schemas.openxmlformats.org/officeDocument/2006/relationships" xmlns:mc="http://schemas.openxmlformats.org/markup-compatibility/2006" xmlns:mv="urn:schemas-microsoft-com:mac:vml" xmlns:p="http://schemas.openxmlformats.org/presentationml/2006/main" xmlns:c="http://schemas.openxmlformats.org/drawingml/2006/chart" xmlns:dgm="http://schemas.openxmlformats.org/drawingml/2006/diagram" xmlns:o="urn:schemas-microsoft-com:office:office" xmlns:v="urn:schemas-microsoft-com:vml" xmlns:pvml="urn:schemas-microsoft-com:office:powerpoint" xmlns:com="http://schemas.openxmlformats.org/drawingml/2006/compatibility" xmlns:p14="http://schemas.microsoft.com/office/powerpoint/2010/main">
-  <p:cSld>
-    <p:spTree>
-      <p:nvGrpSpPr>
-        <p:cNvPr id="200" name="Shape 200"/>
-        <p:cNvGrpSpPr/>
-        <p:nvPr/>
-      </p:nvGrpSpPr>
-      <p:grpSpPr>
-        <a:xfrm>
-          <a:off x="0" y="0"/>
-          <a:ext cx="0" cy="0"/>
-          <a:chOff x="0" y="0"/>
-          <a:chExt cx="0" cy="0"/>
-        </a:xfrm>
-      </p:grpSpPr>
-      <p:sp>
-        <p:nvSpPr>
-          <p:cNvPr id="201" name="Shape 201"/>
-          <p:cNvSpPr txBox="1"/>
-          <p:nvPr>
-            <p:ph type="title"/>
-          </p:nvPr>
-        </p:nvSpPr>
-        <p:spPr>
-          <a:xfrm>
-            <a:off x="822959" y="365760"/>
             <a:ext cx="7520939" cy="548639"/>
           </a:xfrm>
           <a:prstGeom prst="rect">
@@ -14562,7 +14485,7 @@
       </p:sp>
       <p:sp>
         <p:nvSpPr>
-          <p:cNvPr id="202" name="Shape 202"/>
+          <p:cNvPr id="196" name="Shape 196"/>
           <p:cNvSpPr txBox="1"/>
           <p:nvPr>
             <p:ph idx="1" type="body"/>
@@ -14710,18 +14633,13 @@
           </a:bodyPr>
           <a:lstStyle/>
           <a:p>
-            <a:pPr indent="387350" lvl="0" marL="0" rtl="0" algn="just">
+            <a:pPr indent="457200" lvl="0" marL="0" rtl="0" algn="just">
               <a:lnSpc>
                 <a:spcPct val="115000"/>
               </a:lnSpc>
               <a:spcBef>
                 <a:spcPts val="0"/>
               </a:spcBef>
-              <a:buClr>
-                <a:schemeClr val="dk1"/>
-              </a:buClr>
-              <a:buSzPct val="68750"/>
-              <a:buFont typeface="Arial"/>
               <a:buNone/>
             </a:pPr>
             <a:r>
@@ -14731,22 +14649,17 @@
                 <a:cs typeface="Arial"/>
                 <a:sym typeface="Arial"/>
               </a:rPr>
-              <a:t>O Guia PMBOK é um manual de boas práticas aplicadas ao gerenciamento de projetos, e é mantido pelo Project Management Institute, o PMI®.</a:t>
+              <a:t>O PMBOK é um manual de boas práticas aplicadas ao gerenciamento de projetos, na disciplina de GPP será responsável por fornecer as diretrizes para o gerenciamento dos projetos de cada grupo individualmente.</a:t>
             </a:r>
           </a:p>
           <a:p>
-            <a:pPr indent="387350" lvl="0" marL="0" rtl="0" algn="just">
+            <a:pPr indent="457200" lvl="0" marL="0" rtl="0" algn="just">
               <a:lnSpc>
                 <a:spcPct val="115000"/>
               </a:lnSpc>
               <a:spcBef>
                 <a:spcPts val="0"/>
               </a:spcBef>
-              <a:buClr>
-                <a:schemeClr val="dk1"/>
-              </a:buClr>
-              <a:buSzPct val="68750"/>
-              <a:buFont typeface="Arial"/>
               <a:buNone/>
             </a:pPr>
             <a:r>
@@ -14756,25 +14669,7 @@
                 <a:cs typeface="Arial"/>
                 <a:sym typeface="Arial"/>
               </a:rPr>
-              <a:t>PMBOK® é uma abreviação do inglês “</a:t>
-            </a:r>
-            <a:r>
-              <a:rPr b="0" i="1" lang="pt-BR">
-                <a:latin typeface="Arial"/>
-                <a:ea typeface="Arial"/>
-                <a:cs typeface="Arial"/>
-                <a:sym typeface="Arial"/>
-              </a:rPr>
-              <a:t>Project Management Body Of Knowledg</a:t>
-            </a:r>
-            <a:r>
-              <a:rPr b="0" lang="pt-BR">
-                <a:latin typeface="Arial"/>
-                <a:ea typeface="Arial"/>
-                <a:cs typeface="Arial"/>
-                <a:sym typeface="Arial"/>
-              </a:rPr>
-              <a:t>e” que podemos traduzir para o português como “O Corpo de Conhecimento em Gerenciamento de Projetos”, ou como o próprio PMBOK® em português se entitula: “O Guia do Conhecimento em Gerenciamento de Projetos”.</a:t>
+              <a:t>O PMBOK é composto por 47 processos divididos em cinco grupos de processos, porém muitos processos não entram no escopo da disciplina e por esse motivo e para facilitar o aluno neste contexto, vamos abordar nesta apresentação um mapa geral do PMBOK aplicado a disciplina de GPP. </a:t>
             </a:r>
           </a:p>
           <a:p>
@@ -14794,7 +14689,52 @@
                 <a:cs typeface="Arial"/>
                 <a:sym typeface="Arial"/>
               </a:rPr>
-              <a:t>O Guia do Conhecimento em Gerenciamento de Projetos fornece diretrizes para o gerenciamento de projetos individuais e define os conceitos relacionados com o gerenciamento de projetos. Ele também descreve o ciclo de vida de gerenciamento de projetos e seus respectivos processos, assim como o ciclo de vida do projeto. O Guia PMBOK® contém o padrão e guia globalmente reconhecidos para a profissão de gerenciamento de projetos.</a:t>
+              <a:t>Não veremos todos os processos e nem os grupos de processos, pois só será abordado aqueles que são aplicados no contexto de GPP para a release um da disciplina.</a:t>
+            </a:r>
+          </a:p>
+          <a:p>
+            <a:pPr indent="387350" lvl="0" marL="0" rtl="0" algn="just">
+              <a:lnSpc>
+                <a:spcPct val="115000"/>
+              </a:lnSpc>
+              <a:spcBef>
+                <a:spcPts val="0"/>
+              </a:spcBef>
+              <a:buClr>
+                <a:schemeClr val="dk1"/>
+              </a:buClr>
+              <a:buSzPct val="68750"/>
+              <a:buFont typeface="Arial"/>
+              <a:buNone/>
+            </a:pPr>
+            <a:r>
+              <a:t/>
+            </a:r>
+            <a:endParaRPr b="0">
+              <a:latin typeface="Arial"/>
+              <a:ea typeface="Arial"/>
+              <a:cs typeface="Arial"/>
+              <a:sym typeface="Arial"/>
+            </a:endParaRPr>
+          </a:p>
+          <a:p>
+            <a:pPr indent="457200" lvl="0" marL="0" rtl="0" algn="just">
+              <a:lnSpc>
+                <a:spcPct val="115000"/>
+              </a:lnSpc>
+              <a:spcBef>
+                <a:spcPts val="0"/>
+              </a:spcBef>
+              <a:buNone/>
+            </a:pPr>
+            <a:r>
+              <a:rPr b="0" lang="pt-BR">
+                <a:latin typeface="Arial"/>
+                <a:ea typeface="Arial"/>
+                <a:cs typeface="Arial"/>
+                <a:sym typeface="Arial"/>
+              </a:rPr>
+              <a:t>.</a:t>
             </a:r>
           </a:p>
           <a:p>
@@ -14871,327 +14811,6 @@
         </p:nvSpPr>
         <p:spPr>
           <a:xfrm>
-            <a:off x="822959" y="365760"/>
-            <a:ext cx="7521000" cy="548700"/>
-          </a:xfrm>
-          <a:prstGeom prst="rect">
-            <a:avLst/>
-          </a:prstGeom>
-        </p:spPr>
-        <p:txBody>
-          <a:bodyPr anchorCtr="0" anchor="ctr" bIns="91425" lIns="91425" rIns="91425" tIns="91425">
-            <a:noAutofit/>
-          </a:bodyPr>
-          <a:lstStyle/>
-          <a:p>
-            <a:pPr lvl="0" algn="ctr">
-              <a:spcBef>
-                <a:spcPts val="0"/>
-              </a:spcBef>
-              <a:buNone/>
-            </a:pPr>
-            <a:r>
-              <a:rPr lang="pt-BR" sz="3000">
-                <a:latin typeface="Arial"/>
-                <a:ea typeface="Arial"/>
-                <a:cs typeface="Arial"/>
-                <a:sym typeface="Arial"/>
-              </a:rPr>
-              <a:t>Introdução</a:t>
-            </a:r>
-          </a:p>
-        </p:txBody>
-      </p:sp>
-      <p:sp>
-        <p:nvSpPr>
-          <p:cNvPr id="108" name="Shape 108"/>
-          <p:cNvSpPr txBox="1"/>
-          <p:nvPr>
-            <p:ph idx="1" type="body"/>
-          </p:nvPr>
-        </p:nvSpPr>
-        <p:spPr>
-          <a:xfrm>
-            <a:off x="66850" y="1100625"/>
-            <a:ext cx="8846100" cy="4601100"/>
-          </a:xfrm>
-          <a:prstGeom prst="rect">
-            <a:avLst/>
-          </a:prstGeom>
-        </p:spPr>
-        <p:txBody>
-          <a:bodyPr anchorCtr="0" anchor="t" bIns="91425" lIns="91425" rIns="91425" tIns="91425">
-            <a:noAutofit/>
-          </a:bodyPr>
-          <a:lstStyle/>
-          <a:p>
-            <a:pPr indent="387350" lvl="0" marL="0" rtl="0" algn="just">
-              <a:lnSpc>
-                <a:spcPct val="115000"/>
-              </a:lnSpc>
-              <a:spcBef>
-                <a:spcPts val="0"/>
-              </a:spcBef>
-              <a:buClr>
-                <a:schemeClr val="dk1"/>
-              </a:buClr>
-              <a:buSzPct val="100000"/>
-              <a:buFont typeface="Arial"/>
-              <a:buNone/>
-            </a:pPr>
-            <a:r>
-              <a:rPr b="0" lang="pt-BR">
-                <a:latin typeface="Arial"/>
-                <a:ea typeface="Arial"/>
-                <a:cs typeface="Arial"/>
-                <a:sym typeface="Arial"/>
-              </a:rPr>
-              <a:t>o projeto para atender aos seus requisitos. O gerenciamento de projetos é realizado através da aplicação e integração apropriadas dos 47 processos de gerenciamento de projetos, logicamente agrupados em cinco grupos de processos. Esses cinco grupos de processos são</a:t>
-            </a:r>
-          </a:p>
-          <a:p>
-            <a:pPr indent="-330200" lvl="0" marL="914400" rtl="0" algn="just">
-              <a:lnSpc>
-                <a:spcPct val="115000"/>
-              </a:lnSpc>
-              <a:spcBef>
-                <a:spcPts val="0"/>
-              </a:spcBef>
-              <a:buSzPct val="100000"/>
-              <a:buChar char="●"/>
-            </a:pPr>
-            <a:r>
-              <a:rPr b="0" lang="pt-BR">
-                <a:latin typeface="Arial"/>
-                <a:ea typeface="Arial"/>
-                <a:cs typeface="Arial"/>
-                <a:sym typeface="Arial"/>
-              </a:rPr>
-              <a:t>Iniciação;</a:t>
-            </a:r>
-          </a:p>
-          <a:p>
-            <a:pPr indent="-330200" lvl="0" marL="914400" rtl="0" algn="just">
-              <a:lnSpc>
-                <a:spcPct val="115000"/>
-              </a:lnSpc>
-              <a:spcBef>
-                <a:spcPts val="0"/>
-              </a:spcBef>
-              <a:buSzPct val="100000"/>
-              <a:buChar char="●"/>
-            </a:pPr>
-            <a:r>
-              <a:rPr b="0" lang="pt-BR">
-                <a:latin typeface="Arial"/>
-                <a:ea typeface="Arial"/>
-                <a:cs typeface="Arial"/>
-                <a:sym typeface="Arial"/>
-              </a:rPr>
-              <a:t>Planejamento;</a:t>
-            </a:r>
-          </a:p>
-          <a:p>
-            <a:pPr indent="-330200" lvl="0" marL="914400" rtl="0" algn="just">
-              <a:lnSpc>
-                <a:spcPct val="115000"/>
-              </a:lnSpc>
-              <a:spcBef>
-                <a:spcPts val="0"/>
-              </a:spcBef>
-              <a:buSzPct val="100000"/>
-              <a:buChar char="●"/>
-            </a:pPr>
-            <a:r>
-              <a:rPr b="0" lang="pt-BR">
-                <a:latin typeface="Arial"/>
-                <a:ea typeface="Arial"/>
-                <a:cs typeface="Arial"/>
-                <a:sym typeface="Arial"/>
-              </a:rPr>
-              <a:t>Execução;</a:t>
-            </a:r>
-          </a:p>
-          <a:p>
-            <a:pPr indent="-330200" lvl="0" marL="914400" rtl="0" algn="just">
-              <a:lnSpc>
-                <a:spcPct val="115000"/>
-              </a:lnSpc>
-              <a:spcBef>
-                <a:spcPts val="0"/>
-              </a:spcBef>
-              <a:buSzPct val="100000"/>
-              <a:buChar char="●"/>
-            </a:pPr>
-            <a:r>
-              <a:rPr b="0" lang="pt-BR">
-                <a:latin typeface="Arial"/>
-                <a:ea typeface="Arial"/>
-                <a:cs typeface="Arial"/>
-                <a:sym typeface="Arial"/>
-              </a:rPr>
-              <a:t>Monitoramento e controle;</a:t>
-            </a:r>
-          </a:p>
-          <a:p>
-            <a:pPr indent="-330200" lvl="0" marL="914400" rtl="0" algn="just">
-              <a:lnSpc>
-                <a:spcPct val="115000"/>
-              </a:lnSpc>
-              <a:spcBef>
-                <a:spcPts val="0"/>
-              </a:spcBef>
-              <a:buSzPct val="100000"/>
-              <a:buChar char="●"/>
-            </a:pPr>
-            <a:r>
-              <a:rPr b="0" lang="pt-BR">
-                <a:latin typeface="Arial"/>
-                <a:ea typeface="Arial"/>
-                <a:cs typeface="Arial"/>
-                <a:sym typeface="Arial"/>
-              </a:rPr>
-              <a:t>Encerramento.</a:t>
-            </a:r>
-          </a:p>
-          <a:p>
-            <a:pPr lvl="0" marL="0" rtl="0" algn="just">
-              <a:lnSpc>
-                <a:spcPct val="115000"/>
-              </a:lnSpc>
-              <a:spcBef>
-                <a:spcPts val="0"/>
-              </a:spcBef>
-              <a:buClr>
-                <a:schemeClr val="dk1"/>
-              </a:buClr>
-              <a:buSzPct val="68750"/>
-              <a:buFont typeface="Arial"/>
-              <a:buNone/>
-            </a:pPr>
-            <a:r>
-              <a:t/>
-            </a:r>
-            <a:endParaRPr b="0">
-              <a:latin typeface="Arial"/>
-              <a:ea typeface="Arial"/>
-              <a:cs typeface="Arial"/>
-              <a:sym typeface="Arial"/>
-            </a:endParaRPr>
-          </a:p>
-          <a:p>
-            <a:pPr indent="387350" lvl="0" marL="0" rtl="0" algn="just">
-              <a:lnSpc>
-                <a:spcPct val="115000"/>
-              </a:lnSpc>
-              <a:spcBef>
-                <a:spcPts val="0"/>
-              </a:spcBef>
-              <a:buClr>
-                <a:schemeClr val="dk1"/>
-              </a:buClr>
-              <a:buSzPct val="68750"/>
-              <a:buFont typeface="Arial"/>
-              <a:buNone/>
-            </a:pPr>
-            <a:r>
-              <a:rPr b="0" lang="pt-BR">
-                <a:highlight>
-                  <a:srgbClr val="FFFFFF"/>
-                </a:highlight>
-                <a:latin typeface="Arial"/>
-                <a:ea typeface="Arial"/>
-                <a:cs typeface="Arial"/>
-                <a:sym typeface="Arial"/>
-              </a:rPr>
-              <a:t>Isso </a:t>
-            </a:r>
-            <a:r>
-              <a:rPr lang="pt-BR">
-                <a:highlight>
-                  <a:srgbClr val="FFFFFF"/>
-                </a:highlight>
-                <a:latin typeface="Arial"/>
-                <a:ea typeface="Arial"/>
-                <a:cs typeface="Arial"/>
-                <a:sym typeface="Arial"/>
-              </a:rPr>
-              <a:t>não</a:t>
-            </a:r>
-            <a:r>
-              <a:rPr b="0" lang="pt-BR">
-                <a:highlight>
-                  <a:srgbClr val="FFFFFF"/>
-                </a:highlight>
-                <a:latin typeface="Arial"/>
-                <a:ea typeface="Arial"/>
-                <a:cs typeface="Arial"/>
-                <a:sym typeface="Arial"/>
-              </a:rPr>
-              <a:t> significa que você como gerente </a:t>
-            </a:r>
-            <a:r>
-              <a:rPr lang="pt-BR">
-                <a:highlight>
-                  <a:srgbClr val="FFFFFF"/>
-                </a:highlight>
-                <a:latin typeface="Arial"/>
-                <a:ea typeface="Arial"/>
-                <a:cs typeface="Arial"/>
-                <a:sym typeface="Arial"/>
-              </a:rPr>
-              <a:t>é obrigado</a:t>
-            </a:r>
-            <a:r>
-              <a:rPr b="0" lang="pt-BR">
-                <a:highlight>
-                  <a:srgbClr val="FFFFFF"/>
-                </a:highlight>
-                <a:latin typeface="Arial"/>
-                <a:ea typeface="Arial"/>
-                <a:cs typeface="Arial"/>
-                <a:sym typeface="Arial"/>
-              </a:rPr>
-              <a:t> a aplicar e seguir todos os 47 processos em todos os seus projetos, isso não é verdade e nem uma lei.</a:t>
-            </a:r>
-          </a:p>
-        </p:txBody>
-      </p:sp>
-    </p:spTree>
-  </p:cSld>
-  <p:clrMapOvr>
-    <a:masterClrMapping/>
-  </p:clrMapOvr>
-</p:sld>
-</file>
-
-<file path=ppt/slides/slide4.xml><?xml version="1.0" encoding="utf-8"?>
-<p:sld xmlns:a="http://schemas.openxmlformats.org/drawingml/2006/main" xmlns:r="http://schemas.openxmlformats.org/officeDocument/2006/relationships" xmlns:mc="http://schemas.openxmlformats.org/markup-compatibility/2006" xmlns:mv="urn:schemas-microsoft-com:mac:vml" xmlns:p="http://schemas.openxmlformats.org/presentationml/2006/main" xmlns:c="http://schemas.openxmlformats.org/drawingml/2006/chart" xmlns:dgm="http://schemas.openxmlformats.org/drawingml/2006/diagram" xmlns:o="urn:schemas-microsoft-com:office:office" xmlns:v="urn:schemas-microsoft-com:vml" xmlns:pvml="urn:schemas-microsoft-com:office:powerpoint" xmlns:com="http://schemas.openxmlformats.org/drawingml/2006/compatibility" xmlns:p14="http://schemas.microsoft.com/office/powerpoint/2010/main">
-  <p:cSld>
-    <p:spTree>
-      <p:nvGrpSpPr>
-        <p:cNvPr id="112" name="Shape 112"/>
-        <p:cNvGrpSpPr/>
-        <p:nvPr/>
-      </p:nvGrpSpPr>
-      <p:grpSpPr>
-        <a:xfrm>
-          <a:off x="0" y="0"/>
-          <a:ext cx="0" cy="0"/>
-          <a:chOff x="0" y="0"/>
-          <a:chExt cx="0" cy="0"/>
-        </a:xfrm>
-      </p:grpSpPr>
-      <p:sp>
-        <p:nvSpPr>
-          <p:cNvPr id="113" name="Shape 113"/>
-          <p:cNvSpPr txBox="1"/>
-          <p:nvPr>
-            <p:ph type="title"/>
-          </p:nvPr>
-        </p:nvSpPr>
-        <p:spPr>
-          <a:xfrm>
             <a:off x="226950" y="71350"/>
             <a:ext cx="8117100" cy="587100"/>
           </a:xfrm>
@@ -15242,7 +14861,7 @@
       </p:sp>
       <p:sp>
         <p:nvSpPr>
-          <p:cNvPr id="114" name="Shape 114"/>
+          <p:cNvPr id="108" name="Shape 108"/>
           <p:cNvSpPr txBox="1"/>
           <p:nvPr>
             <p:ph idx="1" type="body"/>
@@ -15312,7 +14931,7 @@
       </p:sp>
       <p:pic>
         <p:nvPicPr>
-          <p:cNvPr descr="fluxoPmbok.jpg" id="115" name="Shape 115"/>
+          <p:cNvPr descr="fluxoPmbok.jpg" id="109" name="Shape 109"/>
           <p:cNvPicPr preferRelativeResize="0"/>
           <p:nvPr/>
         </p:nvPicPr>
@@ -15325,8 +14944,114 @@
         </p:blipFill>
         <p:spPr>
           <a:xfrm>
-            <a:off x="0" y="1148250"/>
-            <a:ext cx="9144000" cy="5649300"/>
+            <a:off x="217550" y="1313100"/>
+            <a:ext cx="8731800" cy="5394600"/>
+          </a:xfrm>
+          <a:prstGeom prst="rect">
+            <a:avLst/>
+          </a:prstGeom>
+          <a:noFill/>
+          <a:ln>
+            <a:noFill/>
+          </a:ln>
+        </p:spPr>
+      </p:pic>
+    </p:spTree>
+  </p:cSld>
+  <p:clrMapOvr>
+    <a:masterClrMapping/>
+  </p:clrMapOvr>
+</p:sld>
+</file>
+
+<file path=ppt/slides/slide4.xml><?xml version="1.0" encoding="utf-8"?>
+<p:sld xmlns:a="http://schemas.openxmlformats.org/drawingml/2006/main" xmlns:r="http://schemas.openxmlformats.org/officeDocument/2006/relationships" xmlns:mc="http://schemas.openxmlformats.org/markup-compatibility/2006" xmlns:mv="urn:schemas-microsoft-com:mac:vml" xmlns:p="http://schemas.openxmlformats.org/presentationml/2006/main" xmlns:c="http://schemas.openxmlformats.org/drawingml/2006/chart" xmlns:dgm="http://schemas.openxmlformats.org/drawingml/2006/diagram" xmlns:o="urn:schemas-microsoft-com:office:office" xmlns:v="urn:schemas-microsoft-com:vml" xmlns:pvml="urn:schemas-microsoft-com:office:powerpoint" xmlns:com="http://schemas.openxmlformats.org/drawingml/2006/compatibility" xmlns:p14="http://schemas.microsoft.com/office/powerpoint/2010/main">
+  <p:cSld>
+    <p:spTree>
+      <p:nvGrpSpPr>
+        <p:cNvPr id="113" name="Shape 113"/>
+        <p:cNvGrpSpPr/>
+        <p:nvPr/>
+      </p:nvGrpSpPr>
+      <p:grpSpPr>
+        <a:xfrm>
+          <a:off x="0" y="0"/>
+          <a:ext cx="0" cy="0"/>
+          <a:chOff x="0" y="0"/>
+          <a:chExt cx="0" cy="0"/>
+        </a:xfrm>
+      </p:grpSpPr>
+      <p:sp>
+        <p:nvSpPr>
+          <p:cNvPr id="114" name="Shape 114"/>
+          <p:cNvSpPr txBox="1"/>
+          <p:nvPr>
+            <p:ph type="title"/>
+          </p:nvPr>
+        </p:nvSpPr>
+        <p:spPr>
+          <a:xfrm>
+            <a:off x="457200" y="0"/>
+            <a:ext cx="8229600" cy="908719"/>
+          </a:xfrm>
+          <a:prstGeom prst="rect">
+            <a:avLst/>
+          </a:prstGeom>
+          <a:noFill/>
+          <a:ln>
+            <a:noFill/>
+          </a:ln>
+        </p:spPr>
+        <p:txBody>
+          <a:bodyPr anchorCtr="0" anchor="ctr" bIns="45700" lIns="91425" rIns="91425" tIns="45700">
+            <a:noAutofit/>
+          </a:bodyPr>
+          <a:lstStyle/>
+          <a:p>
+            <a:pPr indent="0" lvl="0" marL="0" marR="0" rtl="0" algn="l">
+              <a:spcBef>
+                <a:spcPts val="0"/>
+              </a:spcBef>
+              <a:buClr>
+                <a:schemeClr val="dk1"/>
+              </a:buClr>
+              <a:buSzPct val="25000"/>
+              <a:buFont typeface="Source Sans Pro"/>
+              <a:buNone/>
+            </a:pPr>
+            <a:r>
+              <a:rPr b="0" i="0" lang="pt-BR" sz="2800" u="none" cap="none" strike="noStrike">
+                <a:solidFill>
+                  <a:schemeClr val="dk1"/>
+                </a:solidFill>
+                <a:latin typeface="Source Sans Pro"/>
+                <a:ea typeface="Source Sans Pro"/>
+                <a:cs typeface="Source Sans Pro"/>
+                <a:sym typeface="Source Sans Pro"/>
+              </a:rPr>
+              <a:t>PROCESSO GPP</a:t>
+            </a:r>
+          </a:p>
+        </p:txBody>
+      </p:sp>
+      <p:pic>
+        <p:nvPicPr>
+          <p:cNvPr descr="modelagem_trabalho_pmbook.png" id="115" name="Shape 115"/>
+          <p:cNvPicPr preferRelativeResize="0"/>
+          <p:nvPr/>
+        </p:nvPicPr>
+        <p:blipFill>
+          <a:blip r:embed="rId3">
+            <a:alphaModFix/>
+          </a:blip>
+          <a:stretch>
+            <a:fillRect/>
+          </a:stretch>
+        </p:blipFill>
+        <p:spPr>
+          <a:xfrm>
+            <a:off x="0" y="631725"/>
+            <a:ext cx="9143998" cy="6226276"/>
           </a:xfrm>
           <a:prstGeom prst="rect">
             <a:avLst/>
@@ -15372,112 +15097,6 @@
         </p:nvSpPr>
         <p:spPr>
           <a:xfrm>
-            <a:off x="457200" y="0"/>
-            <a:ext cx="8229600" cy="908719"/>
-          </a:xfrm>
-          <a:prstGeom prst="rect">
-            <a:avLst/>
-          </a:prstGeom>
-          <a:noFill/>
-          <a:ln>
-            <a:noFill/>
-          </a:ln>
-        </p:spPr>
-        <p:txBody>
-          <a:bodyPr anchorCtr="0" anchor="ctr" bIns="45700" lIns="91425" rIns="91425" tIns="45700">
-            <a:noAutofit/>
-          </a:bodyPr>
-          <a:lstStyle/>
-          <a:p>
-            <a:pPr indent="0" lvl="0" marL="0" marR="0" rtl="0" algn="l">
-              <a:spcBef>
-                <a:spcPts val="0"/>
-              </a:spcBef>
-              <a:buClr>
-                <a:schemeClr val="dk1"/>
-              </a:buClr>
-              <a:buSzPct val="25000"/>
-              <a:buFont typeface="Source Sans Pro"/>
-              <a:buNone/>
-            </a:pPr>
-            <a:r>
-              <a:rPr b="0" i="0" lang="pt-BR" sz="2800" u="none" cap="none" strike="noStrike">
-                <a:solidFill>
-                  <a:schemeClr val="dk1"/>
-                </a:solidFill>
-                <a:latin typeface="Source Sans Pro"/>
-                <a:ea typeface="Source Sans Pro"/>
-                <a:cs typeface="Source Sans Pro"/>
-                <a:sym typeface="Source Sans Pro"/>
-              </a:rPr>
-              <a:t>PROCESSO GPP</a:t>
-            </a:r>
-          </a:p>
-        </p:txBody>
-      </p:sp>
-      <p:pic>
-        <p:nvPicPr>
-          <p:cNvPr descr="modelagem_trabalho_pmbook.png" id="121" name="Shape 121"/>
-          <p:cNvPicPr preferRelativeResize="0"/>
-          <p:nvPr/>
-        </p:nvPicPr>
-        <p:blipFill>
-          <a:blip r:embed="rId3">
-            <a:alphaModFix/>
-          </a:blip>
-          <a:stretch>
-            <a:fillRect/>
-          </a:stretch>
-        </p:blipFill>
-        <p:spPr>
-          <a:xfrm>
-            <a:off x="0" y="631725"/>
-            <a:ext cx="9143998" cy="6226276"/>
-          </a:xfrm>
-          <a:prstGeom prst="rect">
-            <a:avLst/>
-          </a:prstGeom>
-          <a:noFill/>
-          <a:ln>
-            <a:noFill/>
-          </a:ln>
-        </p:spPr>
-      </p:pic>
-    </p:spTree>
-  </p:cSld>
-  <p:clrMapOvr>
-    <a:masterClrMapping/>
-  </p:clrMapOvr>
-</p:sld>
-</file>
-
-<file path=ppt/slides/slide6.xml><?xml version="1.0" encoding="utf-8"?>
-<p:sld xmlns:a="http://schemas.openxmlformats.org/drawingml/2006/main" xmlns:r="http://schemas.openxmlformats.org/officeDocument/2006/relationships" xmlns:mc="http://schemas.openxmlformats.org/markup-compatibility/2006" xmlns:mv="urn:schemas-microsoft-com:mac:vml" xmlns:p="http://schemas.openxmlformats.org/presentationml/2006/main" xmlns:c="http://schemas.openxmlformats.org/drawingml/2006/chart" xmlns:dgm="http://schemas.openxmlformats.org/drawingml/2006/diagram" xmlns:o="urn:schemas-microsoft-com:office:office" xmlns:v="urn:schemas-microsoft-com:vml" xmlns:pvml="urn:schemas-microsoft-com:office:powerpoint" xmlns:com="http://schemas.openxmlformats.org/drawingml/2006/compatibility" xmlns:p14="http://schemas.microsoft.com/office/powerpoint/2010/main">
-  <p:cSld>
-    <p:spTree>
-      <p:nvGrpSpPr>
-        <p:cNvPr id="125" name="Shape 125"/>
-        <p:cNvGrpSpPr/>
-        <p:nvPr/>
-      </p:nvGrpSpPr>
-      <p:grpSpPr>
-        <a:xfrm>
-          <a:off x="0" y="0"/>
-          <a:ext cx="0" cy="0"/>
-          <a:chOff x="0" y="0"/>
-          <a:chExt cx="0" cy="0"/>
-        </a:xfrm>
-      </p:grpSpPr>
-      <p:sp>
-        <p:nvSpPr>
-          <p:cNvPr id="126" name="Shape 126"/>
-          <p:cNvSpPr txBox="1"/>
-          <p:nvPr>
-            <p:ph type="title"/>
-          </p:nvPr>
-        </p:nvSpPr>
-        <p:spPr>
-          <a:xfrm>
             <a:off x="822959" y="365760"/>
             <a:ext cx="7520939" cy="548639"/>
           </a:xfrm>
@@ -15523,7 +15142,7 @@
       </p:sp>
       <p:sp>
         <p:nvSpPr>
-          <p:cNvPr id="127" name="Shape 127"/>
+          <p:cNvPr id="121" name="Shape 121"/>
           <p:cNvSpPr txBox="1"/>
           <p:nvPr>
             <p:ph idx="1" type="body"/>
@@ -15531,8 +15150,8 @@
         </p:nvSpPr>
         <p:spPr>
           <a:xfrm>
-            <a:off x="457200" y="3264712"/>
-            <a:ext cx="8229600" cy="1904999"/>
+            <a:off x="457200" y="3264728"/>
+            <a:ext cx="8229600" cy="2521800"/>
           </a:xfrm>
           <a:prstGeom prst="rect">
             <a:avLst/>
@@ -15622,19 +15241,166 @@
                 <a:cs typeface="Arial"/>
                 <a:sym typeface="Arial"/>
               </a:rPr>
-              <a:t>Desenvolver o termo de abertura do projeto é o processo de desenvolver um documento que formalmente autoriza a existência de um projeto e dá ao gerente do projeto a autoridade necessária para aplicar recursos organizacionais às atividades do projeto. O principal benefício deste processo é um início de projeto e limites de projeto bem definidos, a criação de um registro formal do projeto, e uma maneira direta da direção executiva aceitar e se comprometer formalmente com o projeto. </a:t>
+              <a:t>Desenvolver o termo de abertura do projeto é o processo de desenvolver um documento que formalmente autoriza a existência de um projeto e dá ao gerente do projeto a autoridade necessária para aplicar recursos organizacionais às atividades do projeto. </a:t>
             </a:r>
+          </a:p>
+          <a:p>
+            <a:pPr indent="387350" lvl="0" marL="0" rtl="0" algn="just">
+              <a:lnSpc>
+                <a:spcPct val="115000"/>
+              </a:lnSpc>
+              <a:spcBef>
+                <a:spcPts val="0"/>
+              </a:spcBef>
+              <a:buClr>
+                <a:schemeClr val="dk1"/>
+              </a:buClr>
+              <a:buSzPct val="68750"/>
+              <a:buFont typeface="Arial"/>
+              <a:buNone/>
+            </a:pPr>
+            <a:r>
+              <a:t/>
+            </a:r>
+            <a:endParaRPr b="0">
+              <a:latin typeface="Arial"/>
+              <a:ea typeface="Arial"/>
+              <a:cs typeface="Arial"/>
+              <a:sym typeface="Arial"/>
+            </a:endParaRPr>
+          </a:p>
+          <a:p>
+            <a:pPr indent="387350" lvl="0" marL="0" rtl="0" algn="just">
+              <a:lnSpc>
+                <a:spcPct val="115000"/>
+              </a:lnSpc>
+              <a:spcBef>
+                <a:spcPts val="0"/>
+              </a:spcBef>
+              <a:buClr>
+                <a:schemeClr val="dk1"/>
+              </a:buClr>
+              <a:buSzPct val="68750"/>
+              <a:buFont typeface="Arial"/>
+              <a:buNone/>
+            </a:pPr>
+            <a:r>
+              <a:t/>
+            </a:r>
+            <a:endParaRPr b="0">
+              <a:latin typeface="Arial"/>
+              <a:ea typeface="Arial"/>
+              <a:cs typeface="Arial"/>
+              <a:sym typeface="Arial"/>
+            </a:endParaRPr>
+          </a:p>
+          <a:p>
+            <a:pPr indent="-69850" lvl="0" marL="0" rtl="0" algn="just">
+              <a:lnSpc>
+                <a:spcPct val="115000"/>
+              </a:lnSpc>
+              <a:spcBef>
+                <a:spcPts val="0"/>
+              </a:spcBef>
+              <a:buClr>
+                <a:schemeClr val="dk1"/>
+              </a:buClr>
+              <a:buSzPct val="91666"/>
+              <a:buFont typeface="Arial"/>
+              <a:buNone/>
+            </a:pPr>
+            <a:r>
+              <a:rPr i="1" lang="pt-BR">
+                <a:latin typeface="Arial"/>
+                <a:ea typeface="Arial"/>
+                <a:cs typeface="Arial"/>
+                <a:sym typeface="Arial"/>
+              </a:rPr>
+              <a:t>Template: </a:t>
+            </a:r>
+            <a:r>
+              <a:rPr b="0" lang="pt-BR" sz="1200" u="sng">
+                <a:solidFill>
+                  <a:schemeClr val="hlink"/>
+                </a:solidFill>
+                <a:latin typeface="Arial"/>
+                <a:ea typeface="Arial"/>
+                <a:cs typeface="Arial"/>
+                <a:sym typeface="Arial"/>
+                <a:hlinkClick r:id="rId3"/>
+              </a:rPr>
+              <a:t>https://docs.google.com/viewer?url=http://www.inovagp.com/files/TAP_inovagp.doc</a:t>
+            </a:r>
+            <a:r>
+              <a:rPr b="0" lang="pt-BR" sz="1200">
+                <a:latin typeface="Arial"/>
+                <a:ea typeface="Arial"/>
+                <a:cs typeface="Arial"/>
+                <a:sym typeface="Arial"/>
+              </a:rPr>
+              <a:t>  </a:t>
+            </a:r>
+          </a:p>
+          <a:p>
+            <a:pPr indent="387350" lvl="0" marL="0" rtl="0" algn="just">
+              <a:lnSpc>
+                <a:spcPct val="115000"/>
+              </a:lnSpc>
+              <a:spcBef>
+                <a:spcPts val="0"/>
+              </a:spcBef>
+              <a:buClr>
+                <a:schemeClr val="dk1"/>
+              </a:buClr>
+              <a:buSzPct val="68750"/>
+              <a:buFont typeface="Arial"/>
+              <a:buNone/>
+            </a:pPr>
+            <a:r>
+              <a:t/>
+            </a:r>
+            <a:endParaRPr b="0">
+              <a:latin typeface="Arial"/>
+              <a:ea typeface="Arial"/>
+              <a:cs typeface="Arial"/>
+              <a:sym typeface="Arial"/>
+            </a:endParaRPr>
+          </a:p>
+          <a:p>
+            <a:pPr indent="-69850" lvl="0" marL="0" rtl="0" algn="just">
+              <a:lnSpc>
+                <a:spcPct val="115000"/>
+              </a:lnSpc>
+              <a:spcBef>
+                <a:spcPts val="0"/>
+              </a:spcBef>
+              <a:buClr>
+                <a:schemeClr val="dk1"/>
+              </a:buClr>
+              <a:buSzPct val="68750"/>
+              <a:buFont typeface="Arial"/>
+              <a:buNone/>
+            </a:pPr>
+            <a:r>
+              <a:t/>
+            </a:r>
+            <a:endParaRPr b="0">
+              <a:latin typeface="Arial"/>
+              <a:ea typeface="Arial"/>
+              <a:cs typeface="Arial"/>
+              <a:sym typeface="Arial"/>
+            </a:endParaRPr>
           </a:p>
         </p:txBody>
       </p:sp>
       <p:pic>
         <p:nvPicPr>
-          <p:cNvPr id="128" name="Shape 128"/>
+          <p:cNvPr id="122" name="Shape 122"/>
           <p:cNvPicPr preferRelativeResize="0"/>
           <p:nvPr/>
         </p:nvPicPr>
         <p:blipFill rotWithShape="1">
-          <a:blip r:embed="rId3">
+          <a:blip r:embed="rId4">
             <a:alphaModFix/>
           </a:blip>
           <a:srcRect b="0" l="0" r="0" t="0"/>
@@ -15662,12 +15428,12 @@
 </p:sld>
 </file>
 
-<file path=ppt/slides/slide7.xml><?xml version="1.0" encoding="utf-8"?>
+<file path=ppt/slides/slide6.xml><?xml version="1.0" encoding="utf-8"?>
 <p:sld xmlns:a="http://schemas.openxmlformats.org/drawingml/2006/main" xmlns:r="http://schemas.openxmlformats.org/officeDocument/2006/relationships" xmlns:mc="http://schemas.openxmlformats.org/markup-compatibility/2006" xmlns:mv="urn:schemas-microsoft-com:mac:vml" xmlns:p="http://schemas.openxmlformats.org/presentationml/2006/main" xmlns:c="http://schemas.openxmlformats.org/drawingml/2006/chart" xmlns:dgm="http://schemas.openxmlformats.org/drawingml/2006/diagram" xmlns:o="urn:schemas-microsoft-com:office:office" xmlns:v="urn:schemas-microsoft-com:vml" xmlns:pvml="urn:schemas-microsoft-com:office:powerpoint" xmlns:com="http://schemas.openxmlformats.org/drawingml/2006/compatibility" xmlns:p14="http://schemas.microsoft.com/office/powerpoint/2010/main">
   <p:cSld>
     <p:spTree>
       <p:nvGrpSpPr>
-        <p:cNvPr id="132" name="Shape 132"/>
+        <p:cNvPr id="126" name="Shape 126"/>
         <p:cNvGrpSpPr/>
         <p:nvPr/>
       </p:nvGrpSpPr>
@@ -15681,7 +15447,7 @@
       </p:grpSpPr>
       <p:sp>
         <p:nvSpPr>
-          <p:cNvPr id="133" name="Shape 133"/>
+          <p:cNvPr id="127" name="Shape 127"/>
           <p:cNvSpPr txBox="1"/>
           <p:nvPr>
             <p:ph type="title"/>
@@ -15734,7 +15500,7 @@
       </p:sp>
       <p:sp>
         <p:nvSpPr>
-          <p:cNvPr id="134" name="Shape 134"/>
+          <p:cNvPr id="128" name="Shape 128"/>
           <p:cNvSpPr txBox="1"/>
           <p:nvPr>
             <p:ph idx="1" type="body"/>
@@ -15787,7 +15553,7 @@
       </p:sp>
       <p:pic>
         <p:nvPicPr>
-          <p:cNvPr id="135" name="Shape 135"/>
+          <p:cNvPr id="129" name="Shape 129"/>
           <p:cNvPicPr preferRelativeResize="0"/>
           <p:nvPr/>
         </p:nvPicPr>
@@ -15812,6 +15578,451 @@
           </a:ln>
         </p:spPr>
       </p:pic>
+    </p:spTree>
+  </p:cSld>
+  <p:clrMapOvr>
+    <a:masterClrMapping/>
+  </p:clrMapOvr>
+</p:sld>
+</file>
+
+<file path=ppt/slides/slide7.xml><?xml version="1.0" encoding="utf-8"?>
+<p:sld xmlns:a="http://schemas.openxmlformats.org/drawingml/2006/main" xmlns:r="http://schemas.openxmlformats.org/officeDocument/2006/relationships" xmlns:mc="http://schemas.openxmlformats.org/markup-compatibility/2006" xmlns:mv="urn:schemas-microsoft-com:mac:vml" xmlns:p="http://schemas.openxmlformats.org/presentationml/2006/main" xmlns:c="http://schemas.openxmlformats.org/drawingml/2006/chart" xmlns:dgm="http://schemas.openxmlformats.org/drawingml/2006/diagram" xmlns:o="urn:schemas-microsoft-com:office:office" xmlns:v="urn:schemas-microsoft-com:vml" xmlns:pvml="urn:schemas-microsoft-com:office:powerpoint" xmlns:com="http://schemas.openxmlformats.org/drawingml/2006/compatibility" xmlns:p14="http://schemas.microsoft.com/office/powerpoint/2010/main">
+  <p:cSld>
+    <p:spTree>
+      <p:nvGrpSpPr>
+        <p:cNvPr id="133" name="Shape 133"/>
+        <p:cNvGrpSpPr/>
+        <p:nvPr/>
+      </p:nvGrpSpPr>
+      <p:grpSpPr>
+        <a:xfrm>
+          <a:off x="0" y="0"/>
+          <a:ext cx="0" cy="0"/>
+          <a:chOff x="0" y="0"/>
+          <a:chExt cx="0" cy="0"/>
+        </a:xfrm>
+      </p:grpSpPr>
+      <p:sp>
+        <p:nvSpPr>
+          <p:cNvPr id="134" name="Shape 134"/>
+          <p:cNvSpPr txBox="1"/>
+          <p:nvPr>
+            <p:ph type="title"/>
+          </p:nvPr>
+        </p:nvSpPr>
+        <p:spPr>
+          <a:xfrm>
+            <a:off x="822959" y="365760"/>
+            <a:ext cx="7521000" cy="548700"/>
+          </a:xfrm>
+          <a:prstGeom prst="rect">
+            <a:avLst/>
+          </a:prstGeom>
+          <a:noFill/>
+          <a:ln>
+            <a:noFill/>
+          </a:ln>
+        </p:spPr>
+        <p:txBody>
+          <a:bodyPr anchorCtr="0" anchor="ctr" bIns="45700" lIns="91425" rIns="91425" tIns="45700">
+            <a:noAutofit/>
+          </a:bodyPr>
+          <a:lstStyle/>
+          <a:p>
+            <a:pPr indent="0" lvl="0" marL="0" marR="0" rtl="0" algn="l">
+              <a:spcBef>
+                <a:spcPts val="0"/>
+              </a:spcBef>
+              <a:buClr>
+                <a:schemeClr val="dk1"/>
+              </a:buClr>
+              <a:buSzPct val="25000"/>
+              <a:buFont typeface="Source Sans Pro"/>
+              <a:buNone/>
+            </a:pPr>
+            <a:r>
+              <a:rPr b="0" i="0" lang="pt-BR" sz="2800" u="none" cap="none" strike="noStrike">
+                <a:solidFill>
+                  <a:schemeClr val="dk1"/>
+                </a:solidFill>
+                <a:latin typeface="Source Sans Pro"/>
+                <a:ea typeface="Source Sans Pro"/>
+                <a:cs typeface="Source Sans Pro"/>
+                <a:sym typeface="Source Sans Pro"/>
+              </a:rPr>
+              <a:t>PLANEJAMENTO</a:t>
+            </a:r>
+          </a:p>
+        </p:txBody>
+      </p:sp>
+      <p:sp>
+        <p:nvSpPr>
+          <p:cNvPr id="135" name="Shape 135"/>
+          <p:cNvSpPr txBox="1"/>
+          <p:nvPr>
+            <p:ph idx="1" type="body"/>
+          </p:nvPr>
+        </p:nvSpPr>
+        <p:spPr>
+          <a:xfrm>
+            <a:off x="457200" y="1265050"/>
+            <a:ext cx="8229600" cy="4653300"/>
+          </a:xfrm>
+          <a:prstGeom prst="rect">
+            <a:avLst/>
+          </a:prstGeom>
+          <a:noFill/>
+          <a:ln>
+            <a:noFill/>
+          </a:ln>
+        </p:spPr>
+        <p:txBody>
+          <a:bodyPr anchorCtr="0" anchor="t" bIns="45700" lIns="91425" rIns="91425" tIns="45700">
+            <a:noAutofit/>
+          </a:bodyPr>
+          <a:lstStyle/>
+          <a:p>
+            <a:pPr indent="-330200" lvl="0" marL="457200" rtl="0">
+              <a:lnSpc>
+                <a:spcPct val="115000"/>
+              </a:lnSpc>
+              <a:spcBef>
+                <a:spcPts val="0"/>
+              </a:spcBef>
+              <a:buSzPct val="100000"/>
+              <a:buChar char="●"/>
+            </a:pPr>
+            <a:r>
+              <a:rPr lang="pt-BR">
+                <a:latin typeface="Arial"/>
+                <a:ea typeface="Arial"/>
+                <a:cs typeface="Arial"/>
+                <a:sym typeface="Arial"/>
+              </a:rPr>
+              <a:t>Criar o Plano de Gerenciamento de Escopo</a:t>
+            </a:r>
+          </a:p>
+          <a:p>
+            <a:pPr lvl="0" marL="0" rtl="0" algn="just">
+              <a:lnSpc>
+                <a:spcPct val="115000"/>
+              </a:lnSpc>
+              <a:spcBef>
+                <a:spcPts val="0"/>
+              </a:spcBef>
+              <a:buClr>
+                <a:schemeClr val="dk1"/>
+              </a:buClr>
+              <a:buSzPct val="68750"/>
+              <a:buFont typeface="Arial"/>
+              <a:buNone/>
+            </a:pPr>
+            <a:r>
+              <a:rPr lang="pt-BR">
+                <a:latin typeface="Arial"/>
+                <a:ea typeface="Arial"/>
+                <a:cs typeface="Arial"/>
+                <a:sym typeface="Arial"/>
+              </a:rPr>
+              <a:t>PMBOK: págs. 72 a 78</a:t>
+            </a:r>
+          </a:p>
+          <a:p>
+            <a:pPr indent="387350" lvl="0" marL="0" rtl="0" algn="just">
+              <a:lnSpc>
+                <a:spcPct val="115000"/>
+              </a:lnSpc>
+              <a:spcBef>
+                <a:spcPts val="0"/>
+              </a:spcBef>
+              <a:buClr>
+                <a:schemeClr val="dk1"/>
+              </a:buClr>
+              <a:buSzPct val="68750"/>
+              <a:buFont typeface="Arial"/>
+              <a:buNone/>
+            </a:pPr>
+            <a:r>
+              <a:rPr b="0" lang="pt-BR">
+                <a:latin typeface="Arial"/>
+                <a:ea typeface="Arial"/>
+                <a:cs typeface="Arial"/>
+                <a:sym typeface="Arial"/>
+              </a:rPr>
+              <a:t>Planejamento e criação de um plano de gerenciamento do escopo fornece a orientação e instruções sobre como o escopo será gerenciado ao longo de todo o projeto.</a:t>
+            </a:r>
+          </a:p>
+          <a:p>
+            <a:pPr indent="387350" lvl="0" marL="0" rtl="0" algn="just">
+              <a:lnSpc>
+                <a:spcPct val="115000"/>
+              </a:lnSpc>
+              <a:spcBef>
+                <a:spcPts val="0"/>
+              </a:spcBef>
+              <a:buClr>
+                <a:schemeClr val="dk1"/>
+              </a:buClr>
+              <a:buSzPct val="68750"/>
+              <a:buFont typeface="Arial"/>
+              <a:buNone/>
+            </a:pPr>
+            <a:r>
+              <a:rPr b="0" lang="pt-BR">
+                <a:latin typeface="Arial"/>
+                <a:ea typeface="Arial"/>
+                <a:cs typeface="Arial"/>
+                <a:sym typeface="Arial"/>
+              </a:rPr>
+              <a:t>	 </a:t>
+            </a:r>
+          </a:p>
+          <a:p>
+            <a:pPr indent="-69850" lvl="0" marL="0" rtl="0" algn="just">
+              <a:lnSpc>
+                <a:spcPct val="115000"/>
+              </a:lnSpc>
+              <a:spcBef>
+                <a:spcPts val="0"/>
+              </a:spcBef>
+              <a:buClr>
+                <a:schemeClr val="dk1"/>
+              </a:buClr>
+              <a:buSzPct val="68750"/>
+              <a:buFont typeface="Arial"/>
+              <a:buNone/>
+            </a:pPr>
+            <a:r>
+              <a:rPr i="1" lang="pt-BR">
+                <a:latin typeface="Arial"/>
+                <a:ea typeface="Arial"/>
+                <a:cs typeface="Arial"/>
+                <a:sym typeface="Arial"/>
+              </a:rPr>
+              <a:t>Template: </a:t>
+            </a:r>
+            <a:r>
+              <a:rPr b="0" lang="pt-BR" sz="1100" u="sng">
+                <a:solidFill>
+                  <a:schemeClr val="hlink"/>
+                </a:solidFill>
+                <a:latin typeface="Arial"/>
+                <a:ea typeface="Arial"/>
+                <a:cs typeface="Arial"/>
+                <a:sym typeface="Arial"/>
+                <a:hlinkClick r:id="rId3"/>
+              </a:rPr>
+              <a:t>http://docs.google.com/viewer?url=http://www.inovagp.com/files/plano_de_gerenciamento_de_escopo_inovagp.doc</a:t>
+            </a:r>
+            <a:r>
+              <a:rPr b="0" lang="pt-BR" sz="1100">
+                <a:latin typeface="Arial"/>
+                <a:ea typeface="Arial"/>
+                <a:cs typeface="Arial"/>
+                <a:sym typeface="Arial"/>
+              </a:rPr>
+              <a:t> </a:t>
+            </a:r>
+            <a:r>
+              <a:rPr b="0" lang="pt-BR">
+                <a:latin typeface="Arial"/>
+                <a:ea typeface="Arial"/>
+                <a:cs typeface="Arial"/>
+                <a:sym typeface="Arial"/>
+              </a:rPr>
+              <a:t>	 		</a:t>
+            </a:r>
+          </a:p>
+          <a:p>
+            <a:pPr indent="-69850" lvl="0" marL="0" rtl="0" algn="just">
+              <a:lnSpc>
+                <a:spcPct val="115000"/>
+              </a:lnSpc>
+              <a:spcBef>
+                <a:spcPts val="0"/>
+              </a:spcBef>
+              <a:buClr>
+                <a:schemeClr val="dk1"/>
+              </a:buClr>
+              <a:buSzPct val="68750"/>
+              <a:buFont typeface="Arial"/>
+              <a:buNone/>
+            </a:pPr>
+            <a:r>
+              <a:t/>
+            </a:r>
+            <a:endParaRPr b="0">
+              <a:latin typeface="Arial"/>
+              <a:ea typeface="Arial"/>
+              <a:cs typeface="Arial"/>
+              <a:sym typeface="Arial"/>
+            </a:endParaRPr>
+          </a:p>
+          <a:p>
+            <a:pPr indent="-330200" lvl="0" marL="457200" rtl="0" algn="just">
+              <a:lnSpc>
+                <a:spcPct val="115000"/>
+              </a:lnSpc>
+              <a:spcBef>
+                <a:spcPts val="0"/>
+              </a:spcBef>
+              <a:buSzPct val="100000"/>
+              <a:buFont typeface="Arial"/>
+              <a:buChar char="●"/>
+            </a:pPr>
+            <a:r>
+              <a:rPr lang="pt-BR">
+                <a:latin typeface="Arial"/>
+                <a:ea typeface="Arial"/>
+                <a:cs typeface="Arial"/>
+                <a:sym typeface="Arial"/>
+              </a:rPr>
+              <a:t>Criar o plano de gerenciamento do projeto</a:t>
+            </a:r>
+          </a:p>
+          <a:p>
+            <a:pPr lvl="0" marL="0" rtl="0" algn="just">
+              <a:lnSpc>
+                <a:spcPct val="115000"/>
+              </a:lnSpc>
+              <a:spcBef>
+                <a:spcPts val="0"/>
+              </a:spcBef>
+              <a:buClr>
+                <a:schemeClr val="dk1"/>
+              </a:buClr>
+              <a:buSzPct val="68750"/>
+              <a:buFont typeface="Arial"/>
+              <a:buNone/>
+            </a:pPr>
+            <a:r>
+              <a:rPr lang="pt-BR">
+                <a:latin typeface="Arial"/>
+                <a:ea typeface="Arial"/>
+                <a:cs typeface="Arial"/>
+                <a:sym typeface="Arial"/>
+              </a:rPr>
+              <a:t>PMBOK: págs. 72 a 78.</a:t>
+            </a:r>
+          </a:p>
+          <a:p>
+            <a:pPr indent="387350" lvl="0" marL="0" rtl="0" algn="just">
+              <a:lnSpc>
+                <a:spcPct val="115000"/>
+              </a:lnSpc>
+              <a:spcBef>
+                <a:spcPts val="0"/>
+              </a:spcBef>
+              <a:buClr>
+                <a:schemeClr val="dk1"/>
+              </a:buClr>
+              <a:buSzPct val="68750"/>
+              <a:buFont typeface="Arial"/>
+              <a:buNone/>
+            </a:pPr>
+            <a:r>
+              <a:rPr b="0" lang="pt-BR">
+                <a:latin typeface="Arial"/>
+                <a:ea typeface="Arial"/>
+                <a:cs typeface="Arial"/>
+                <a:sym typeface="Arial"/>
+              </a:rPr>
+              <a:t>Desenvolver o plano de gerenciamento do projeto é o processo de definir, preparar e coordenar todos os planos auxiliares e integrá-los a um plano de gerenciamento de projeto abrangente.</a:t>
+            </a:r>
+            <a:r>
+              <a:rPr b="0" lang="pt-BR" sz="1100">
+                <a:latin typeface="Arial"/>
+                <a:ea typeface="Arial"/>
+                <a:cs typeface="Arial"/>
+                <a:sym typeface="Arial"/>
+              </a:rPr>
+              <a:t> </a:t>
+            </a:r>
+            <a:r>
+              <a:rPr b="0" lang="pt-BR">
+                <a:latin typeface="Arial"/>
+                <a:ea typeface="Arial"/>
+                <a:cs typeface="Arial"/>
+                <a:sym typeface="Arial"/>
+              </a:rPr>
+              <a:t>Documento central que define a base de todo trabalho do projeto.</a:t>
+            </a:r>
+          </a:p>
+          <a:p>
+            <a:pPr indent="-69850" lvl="0" marL="0" rtl="0" algn="just">
+              <a:lnSpc>
+                <a:spcPct val="115000"/>
+              </a:lnSpc>
+              <a:spcBef>
+                <a:spcPts val="0"/>
+              </a:spcBef>
+              <a:buClr>
+                <a:schemeClr val="dk1"/>
+              </a:buClr>
+              <a:buSzPct val="68750"/>
+              <a:buFont typeface="Arial"/>
+              <a:buNone/>
+            </a:pPr>
+            <a:r>
+              <a:t/>
+            </a:r>
+            <a:endParaRPr b="0">
+              <a:latin typeface="Arial"/>
+              <a:ea typeface="Arial"/>
+              <a:cs typeface="Arial"/>
+              <a:sym typeface="Arial"/>
+            </a:endParaRPr>
+          </a:p>
+          <a:p>
+            <a:pPr lvl="0" marL="0" rtl="0" algn="just">
+              <a:lnSpc>
+                <a:spcPct val="115000"/>
+              </a:lnSpc>
+              <a:spcBef>
+                <a:spcPts val="0"/>
+              </a:spcBef>
+              <a:buClr>
+                <a:schemeClr val="dk1"/>
+              </a:buClr>
+              <a:buSzPct val="100000"/>
+              <a:buFont typeface="Arial"/>
+              <a:buNone/>
+            </a:pPr>
+            <a:r>
+              <a:rPr i="1" lang="pt-BR">
+                <a:latin typeface="Arial"/>
+                <a:ea typeface="Arial"/>
+                <a:cs typeface="Arial"/>
+                <a:sym typeface="Arial"/>
+              </a:rPr>
+              <a:t>Template: </a:t>
+            </a:r>
+            <a:r>
+              <a:rPr b="0" i="1" lang="pt-BR" sz="1100" u="sng">
+                <a:solidFill>
+                  <a:schemeClr val="hlink"/>
+                </a:solidFill>
+                <a:latin typeface="Arial"/>
+                <a:ea typeface="Arial"/>
+                <a:cs typeface="Arial"/>
+                <a:sym typeface="Arial"/>
+                <a:hlinkClick r:id="rId4"/>
+              </a:rPr>
+              <a:t>https://escritoriodeprojetos.com.br/component/jdownloads/send/8-modelos/4-plano-de-gerenciamento-do-projeto</a:t>
+            </a:r>
+            <a:r>
+              <a:rPr b="0" i="1" lang="pt-BR" sz="1100">
+                <a:latin typeface="Arial"/>
+                <a:ea typeface="Arial"/>
+                <a:cs typeface="Arial"/>
+                <a:sym typeface="Arial"/>
+              </a:rPr>
+              <a:t>  </a:t>
+            </a:r>
+          </a:p>
+        </p:txBody>
+      </p:sp>
     </p:spTree>
   </p:cSld>
   <p:clrMapOvr>
@@ -15900,8 +16111,8 @@
         </p:nvSpPr>
         <p:spPr>
           <a:xfrm>
-            <a:off x="457200" y="1265061"/>
-            <a:ext cx="8229600" cy="3760200"/>
+            <a:off x="468650" y="1013800"/>
+            <a:ext cx="8229600" cy="4789200"/>
           </a:xfrm>
           <a:prstGeom prst="rect">
             <a:avLst/>
@@ -15917,102 +16128,6 @@
           </a:bodyPr>
           <a:lstStyle/>
           <a:p>
-            <a:pPr indent="-330200" lvl="0" marL="457200" rtl="0">
-              <a:lnSpc>
-                <a:spcPct val="115000"/>
-              </a:lnSpc>
-              <a:spcBef>
-                <a:spcPts val="0"/>
-              </a:spcBef>
-              <a:buSzPct val="100000"/>
-              <a:buChar char="●"/>
-            </a:pPr>
-            <a:r>
-              <a:rPr lang="pt-BR">
-                <a:latin typeface="Arial"/>
-                <a:ea typeface="Arial"/>
-                <a:cs typeface="Arial"/>
-                <a:sym typeface="Arial"/>
-              </a:rPr>
-              <a:t>Criar o Plano de Gerenciamento de Escopo</a:t>
-            </a:r>
-          </a:p>
-          <a:p>
-            <a:pPr lvl="0" marL="0" rtl="0" algn="just">
-              <a:lnSpc>
-                <a:spcPct val="115000"/>
-              </a:lnSpc>
-              <a:spcBef>
-                <a:spcPts val="0"/>
-              </a:spcBef>
-              <a:buClr>
-                <a:schemeClr val="dk1"/>
-              </a:buClr>
-              <a:buSzPct val="68750"/>
-              <a:buFont typeface="Arial"/>
-              <a:buNone/>
-            </a:pPr>
-            <a:r>
-              <a:rPr lang="pt-BR">
-                <a:latin typeface="Arial"/>
-                <a:ea typeface="Arial"/>
-                <a:cs typeface="Arial"/>
-                <a:sym typeface="Arial"/>
-              </a:rPr>
-              <a:t>PMBOK: págs. 72 a 78</a:t>
-            </a:r>
-          </a:p>
-          <a:p>
-            <a:pPr indent="387350" lvl="0" marL="0" rtl="0" algn="just">
-              <a:lnSpc>
-                <a:spcPct val="115000"/>
-              </a:lnSpc>
-              <a:spcBef>
-                <a:spcPts val="0"/>
-              </a:spcBef>
-              <a:buClr>
-                <a:schemeClr val="dk1"/>
-              </a:buClr>
-              <a:buSzPct val="68750"/>
-              <a:buFont typeface="Arial"/>
-              <a:buNone/>
-            </a:pPr>
-            <a:r>
-              <a:rPr b="0" lang="pt-BR">
-                <a:latin typeface="Arial"/>
-                <a:ea typeface="Arial"/>
-                <a:cs typeface="Arial"/>
-                <a:sym typeface="Arial"/>
-              </a:rPr>
-              <a:t>Planejar o gerenciamento do escopo é o processo de criar um plano de gerenciamento do escopo do projeto que documenta como tal escopo será definido, validado e controlado. O principal benefício deste processo é o fornecimento de orientação e instruções sobre como o escopo será gerenciado ao longo de todo o projeto. </a:t>
-            </a:r>
-          </a:p>
-          <a:p>
-            <a:pPr lvl="0" marL="0" rtl="0">
-              <a:lnSpc>
-                <a:spcPct val="115000"/>
-              </a:lnSpc>
-              <a:spcBef>
-                <a:spcPts val="0"/>
-              </a:spcBef>
-              <a:buClr>
-                <a:schemeClr val="dk1"/>
-              </a:buClr>
-              <a:buSzPct val="68750"/>
-              <a:buFont typeface="Arial"/>
-              <a:buNone/>
-            </a:pPr>
-            <a:r>
-              <a:rPr b="0" lang="pt-BR">
-                <a:latin typeface="Arial"/>
-                <a:ea typeface="Arial"/>
-                <a:cs typeface="Arial"/>
-                <a:sym typeface="Arial"/>
-              </a:rPr>
-              <a:t>	 	 		</a:t>
-            </a:r>
-          </a:p>
-          <a:p>
             <a:pPr indent="-330200" lvl="0" marL="457200" rtl="0" algn="just">
               <a:lnSpc>
                 <a:spcPct val="115000"/>
@@ -16031,7 +16146,7 @@
                 <a:cs typeface="Arial"/>
                 <a:sym typeface="Arial"/>
               </a:rPr>
-              <a:t>Criar o plano de gerenciamento do projeto</a:t>
+              <a:t>Criar o plano de gerenciamento das comunicações</a:t>
             </a:r>
           </a:p>
           <a:p>
@@ -16056,11 +16171,11 @@
                 <a:cs typeface="Arial"/>
                 <a:sym typeface="Arial"/>
               </a:rPr>
-              <a:t>PMBOK: págs. 72 a 78.</a:t>
+              <a:t>PMBOK: págs. 287 a 297</a:t>
             </a:r>
           </a:p>
           <a:p>
-            <a:pPr indent="387350" lvl="0" marL="0" rtl="0" algn="just">
+            <a:pPr lvl="0" marL="0" rtl="0" algn="just">
               <a:lnSpc>
                 <a:spcPct val="115000"/>
               </a:lnSpc>
@@ -16081,7 +16196,239 @@
                 <a:cs typeface="Arial"/>
                 <a:sym typeface="Arial"/>
               </a:rPr>
-              <a:t>Desenvolver o plano de gerenciamento do projeto é o processo de definir, preparar e coordenar todos os planos auxiliares e integrá-los a um plano de gerenciamento de projeto abrangente. O principal benefício deste processo é um documento central que define a base de todo trabalho do projeto.</a:t>
+              <a:t>	Planejar o gerenciamento das comunicações é o processo de desenvolver uma abordagem apropriada e um plano de comunicação do projeto. Identificação e a documentação da abordagem de comunicação mais eficaz e eficiente com as partes interessadas. </a:t>
+            </a:r>
+          </a:p>
+          <a:p>
+            <a:pPr lvl="0" marL="0" rtl="0" algn="just">
+              <a:lnSpc>
+                <a:spcPct val="115000"/>
+              </a:lnSpc>
+              <a:spcBef>
+                <a:spcPts val="0"/>
+              </a:spcBef>
+              <a:buClr>
+                <a:schemeClr val="dk1"/>
+              </a:buClr>
+              <a:buSzPct val="68750"/>
+              <a:buFont typeface="Arial"/>
+              <a:buNone/>
+            </a:pPr>
+            <a:r>
+              <a:t/>
+            </a:r>
+            <a:endParaRPr b="0">
+              <a:latin typeface="Arial"/>
+              <a:ea typeface="Arial"/>
+              <a:cs typeface="Arial"/>
+              <a:sym typeface="Arial"/>
+            </a:endParaRPr>
+          </a:p>
+          <a:p>
+            <a:pPr lvl="0" marL="0" rtl="0" algn="just">
+              <a:lnSpc>
+                <a:spcPct val="115000"/>
+              </a:lnSpc>
+              <a:spcBef>
+                <a:spcPts val="0"/>
+              </a:spcBef>
+              <a:buClr>
+                <a:schemeClr val="dk1"/>
+              </a:buClr>
+              <a:buSzPct val="110000"/>
+              <a:buFont typeface="Arial"/>
+              <a:buNone/>
+            </a:pPr>
+            <a:r>
+              <a:rPr i="1" lang="pt-BR">
+                <a:latin typeface="Arial"/>
+                <a:ea typeface="Arial"/>
+                <a:cs typeface="Arial"/>
+                <a:sym typeface="Arial"/>
+              </a:rPr>
+              <a:t>Template:</a:t>
+            </a:r>
+            <a:r>
+              <a:rPr b="0" lang="pt-BR" sz="1000" u="sng">
+                <a:solidFill>
+                  <a:schemeClr val="hlink"/>
+                </a:solidFill>
+                <a:latin typeface="Arial"/>
+                <a:ea typeface="Arial"/>
+                <a:cs typeface="Arial"/>
+                <a:sym typeface="Arial"/>
+                <a:hlinkClick r:id="rId3"/>
+              </a:rPr>
+              <a:t>https://docs.google.com/viewer?url=http://www.inovagp.com/files/plano_de_gerenciamento_de_comunicacoes_inovagp.doc</a:t>
+            </a:r>
+          </a:p>
+          <a:p>
+            <a:pPr lvl="0" marL="0" rtl="0" algn="just">
+              <a:lnSpc>
+                <a:spcPct val="115000"/>
+              </a:lnSpc>
+              <a:spcBef>
+                <a:spcPts val="0"/>
+              </a:spcBef>
+              <a:buClr>
+                <a:schemeClr val="dk1"/>
+              </a:buClr>
+              <a:buSzPct val="68750"/>
+              <a:buFont typeface="Arial"/>
+              <a:buNone/>
+            </a:pPr>
+            <a:r>
+              <a:t/>
+            </a:r>
+            <a:endParaRPr b="0">
+              <a:latin typeface="Arial"/>
+              <a:ea typeface="Arial"/>
+              <a:cs typeface="Arial"/>
+              <a:sym typeface="Arial"/>
+            </a:endParaRPr>
+          </a:p>
+          <a:p>
+            <a:pPr indent="-330200" lvl="0" marL="457200" rtl="0" algn="just">
+              <a:lnSpc>
+                <a:spcPct val="115000"/>
+              </a:lnSpc>
+              <a:spcBef>
+                <a:spcPts val="0"/>
+              </a:spcBef>
+              <a:buSzPct val="100000"/>
+              <a:buFont typeface="Arial"/>
+              <a:buChar char="●"/>
+            </a:pPr>
+            <a:r>
+              <a:rPr lang="pt-BR">
+                <a:latin typeface="Arial"/>
+                <a:ea typeface="Arial"/>
+                <a:cs typeface="Arial"/>
+                <a:sym typeface="Arial"/>
+              </a:rPr>
+              <a:t>Criar o plano de gerenciamento de recursos humanos</a:t>
+            </a:r>
+          </a:p>
+          <a:p>
+            <a:pPr lvl="0" marL="0" rtl="0" algn="just">
+              <a:lnSpc>
+                <a:spcPct val="115000"/>
+              </a:lnSpc>
+              <a:spcBef>
+                <a:spcPts val="0"/>
+              </a:spcBef>
+              <a:buClr>
+                <a:schemeClr val="dk1"/>
+              </a:buClr>
+              <a:buSzPct val="68750"/>
+              <a:buFont typeface="Arial"/>
+              <a:buNone/>
+            </a:pPr>
+            <a:r>
+              <a:rPr lang="pt-BR">
+                <a:latin typeface="Arial"/>
+                <a:ea typeface="Arial"/>
+                <a:cs typeface="Arial"/>
+                <a:sym typeface="Arial"/>
+              </a:rPr>
+              <a:t>PMBOK: págs. 256 a 267</a:t>
+            </a:r>
+          </a:p>
+          <a:p>
+            <a:pPr lvl="0" marL="0" rtl="0" algn="just">
+              <a:lnSpc>
+                <a:spcPct val="115000"/>
+              </a:lnSpc>
+              <a:spcBef>
+                <a:spcPts val="0"/>
+              </a:spcBef>
+              <a:buClr>
+                <a:schemeClr val="dk1"/>
+              </a:buClr>
+              <a:buSzPct val="68750"/>
+              <a:buFont typeface="Arial"/>
+              <a:buNone/>
+            </a:pPr>
+            <a:r>
+              <a:rPr b="0" lang="pt-BR">
+                <a:latin typeface="Arial"/>
+                <a:ea typeface="Arial"/>
+                <a:cs typeface="Arial"/>
+                <a:sym typeface="Arial"/>
+              </a:rPr>
+              <a:t>	Planejar o gerenciamento dos recursos humanos é o processo de identificação e documentação de papéis, responsabilidades, habilidades necessárias e relações hierárquicas do projeto. Estabelecimento dos papéis, responsabilidades e organogramas do projeto, além do plano de gerenciamento de pessoal.</a:t>
+            </a:r>
+          </a:p>
+          <a:p>
+            <a:pPr lvl="0" marL="0" rtl="0" algn="just">
+              <a:lnSpc>
+                <a:spcPct val="115000"/>
+              </a:lnSpc>
+              <a:spcBef>
+                <a:spcPts val="0"/>
+              </a:spcBef>
+              <a:buClr>
+                <a:schemeClr val="dk1"/>
+              </a:buClr>
+              <a:buSzPct val="68750"/>
+              <a:buFont typeface="Arial"/>
+              <a:buNone/>
+            </a:pPr>
+            <a:r>
+              <a:t/>
+            </a:r>
+            <a:endParaRPr b="0">
+              <a:latin typeface="Arial"/>
+              <a:ea typeface="Arial"/>
+              <a:cs typeface="Arial"/>
+              <a:sym typeface="Arial"/>
+            </a:endParaRPr>
+          </a:p>
+          <a:p>
+            <a:pPr lvl="0" marL="0" rtl="0" algn="just">
+              <a:lnSpc>
+                <a:spcPct val="115000"/>
+              </a:lnSpc>
+              <a:spcBef>
+                <a:spcPts val="0"/>
+              </a:spcBef>
+              <a:buClr>
+                <a:schemeClr val="dk1"/>
+              </a:buClr>
+              <a:buSzPct val="68750"/>
+              <a:buFont typeface="Arial"/>
+              <a:buNone/>
+            </a:pPr>
+            <a:r>
+              <a:rPr i="1" lang="pt-BR">
+                <a:latin typeface="Arial"/>
+                <a:ea typeface="Arial"/>
+                <a:cs typeface="Arial"/>
+                <a:sym typeface="Arial"/>
+              </a:rPr>
+              <a:t>Template: </a:t>
+            </a:r>
+            <a:r>
+              <a:rPr b="0" lang="pt-BR" sz="1100" u="sng">
+                <a:solidFill>
+                  <a:schemeClr val="hlink"/>
+                </a:solidFill>
+                <a:latin typeface="Arial"/>
+                <a:ea typeface="Arial"/>
+                <a:cs typeface="Arial"/>
+                <a:sym typeface="Arial"/>
+                <a:hlinkClick r:id="rId4"/>
+              </a:rPr>
+              <a:t>https://docs.google.com/viewer?url=http://www.inovagp.com/files/plano_de_gerenciamento_de_RH_inovagp.doc</a:t>
+            </a:r>
+            <a:r>
+              <a:rPr b="0" lang="pt-BR" sz="1100">
+                <a:latin typeface="Arial"/>
+                <a:ea typeface="Arial"/>
+                <a:cs typeface="Arial"/>
+                <a:sym typeface="Arial"/>
+              </a:rPr>
+              <a:t> </a:t>
             </a:r>
           </a:p>
         </p:txBody>
@@ -16174,8 +16521,8 @@
         </p:nvSpPr>
         <p:spPr>
           <a:xfrm>
-            <a:off x="468650" y="1013811"/>
-            <a:ext cx="8229600" cy="3760200"/>
+            <a:off x="468650" y="1013797"/>
+            <a:ext cx="8229600" cy="4706100"/>
           </a:xfrm>
           <a:prstGeom prst="rect">
             <a:avLst/>
@@ -16209,7 +16556,7 @@
                 <a:cs typeface="Arial"/>
                 <a:sym typeface="Arial"/>
               </a:rPr>
-              <a:t>Criar o plano de gerenciamento das comunicações</a:t>
+              <a:t>Criar o plano de gerenciamento do cronograma</a:t>
             </a:r>
           </a:p>
           <a:p>
@@ -16234,7 +16581,7 @@
                 <a:cs typeface="Arial"/>
                 <a:sym typeface="Arial"/>
               </a:rPr>
-              <a:t>PMBOK: págs. 287 a 297</a:t>
+              <a:t>PMBOK: págs. 145 a 149</a:t>
             </a:r>
           </a:p>
           <a:p>
@@ -16259,7 +16606,92 @@
                 <a:cs typeface="Arial"/>
                 <a:sym typeface="Arial"/>
               </a:rPr>
-              <a:t>	Planejar o gerenciamento das comunicações é o processo de desenvolver uma abordagem apropriada e um plano de comunicação do projeto com base nas necessidades de informação e requisitos das partes interessadas e nos ativos organizacionais disponíveis. O principal benefício deste processo é a identificação e a documentação da abordagem de comunicação mais eficaz e eficiente com as partes interessadas. </a:t>
+              <a:t>	Planejar o gerenciamento do cronograma é o processo de estabelecer as políticas, os procedimentos e a documentação para o planejamento, desenvolvimento, gerenciamento, execução e controle do cronograma do projeto. Orientação e instruções sobre como o cronograma do projeto será gerenciado ao longo de todo o projeto.</a:t>
+            </a:r>
+          </a:p>
+          <a:p>
+            <a:pPr lvl="0" marL="0" rtl="0" algn="just">
+              <a:lnSpc>
+                <a:spcPct val="115000"/>
+              </a:lnSpc>
+              <a:spcBef>
+                <a:spcPts val="0"/>
+              </a:spcBef>
+              <a:buClr>
+                <a:schemeClr val="dk1"/>
+              </a:buClr>
+              <a:buSzPct val="68750"/>
+              <a:buFont typeface="Arial"/>
+              <a:buNone/>
+            </a:pPr>
+            <a:r>
+              <a:t/>
+            </a:r>
+            <a:endParaRPr b="0">
+              <a:latin typeface="Arial"/>
+              <a:ea typeface="Arial"/>
+              <a:cs typeface="Arial"/>
+              <a:sym typeface="Arial"/>
+            </a:endParaRPr>
+          </a:p>
+          <a:p>
+            <a:pPr lvl="0" marL="0" rtl="0" algn="just">
+              <a:lnSpc>
+                <a:spcPct val="115000"/>
+              </a:lnSpc>
+              <a:spcBef>
+                <a:spcPts val="0"/>
+              </a:spcBef>
+              <a:buClr>
+                <a:schemeClr val="dk1"/>
+              </a:buClr>
+              <a:buSzPct val="110000"/>
+              <a:buFont typeface="Arial"/>
+              <a:buNone/>
+            </a:pPr>
+            <a:r>
+              <a:rPr i="1" lang="pt-BR">
+                <a:latin typeface="Arial"/>
+                <a:ea typeface="Arial"/>
+                <a:cs typeface="Arial"/>
+                <a:sym typeface="Arial"/>
+              </a:rPr>
+              <a:t>Template:</a:t>
+            </a:r>
+            <a:r>
+              <a:rPr b="0" lang="pt-BR" sz="1000" u="sng">
+                <a:solidFill>
+                  <a:schemeClr val="hlink"/>
+                </a:solidFill>
+                <a:latin typeface="Arial"/>
+                <a:ea typeface="Arial"/>
+                <a:cs typeface="Arial"/>
+                <a:sym typeface="Arial"/>
+                <a:hlinkClick r:id="rId3"/>
+              </a:rPr>
+              <a:t>h</a:t>
+            </a:r>
+            <a:r>
+              <a:rPr b="0" lang="pt-BR" sz="1100" u="sng">
+                <a:solidFill>
+                  <a:schemeClr val="hlink"/>
+                </a:solidFill>
+                <a:latin typeface="Arial"/>
+                <a:ea typeface="Arial"/>
+                <a:cs typeface="Arial"/>
+                <a:sym typeface="Arial"/>
+                <a:hlinkClick r:id="rId4"/>
+              </a:rPr>
+              <a:t>ttps://docs.google.com/viewer?url=http://www.inovagp.com/files/plano_de_gerenciamento_de_tempo_inovagp.doc</a:t>
+            </a:r>
+            <a:r>
+              <a:rPr b="0" lang="pt-BR" sz="1000">
+                <a:latin typeface="Arial"/>
+                <a:ea typeface="Arial"/>
+                <a:cs typeface="Arial"/>
+                <a:sym typeface="Arial"/>
+              </a:rPr>
+              <a:t> </a:t>
             </a:r>
           </a:p>
           <a:p>
@@ -16306,7 +16738,7 @@
                 <a:cs typeface="Arial"/>
                 <a:sym typeface="Arial"/>
               </a:rPr>
-              <a:t>Criar o plano de gerenciamento de recursos humanos</a:t>
+              <a:t>Criar o plano de gerenciamento de custos</a:t>
             </a:r>
           </a:p>
           <a:p>
@@ -16331,7 +16763,7 @@
                 <a:cs typeface="Arial"/>
                 <a:sym typeface="Arial"/>
               </a:rPr>
-              <a:t>PMBOK: págs. 256 a 267</a:t>
+              <a:t>PMBOK: págs. 195 a 200</a:t>
             </a:r>
           </a:p>
           <a:p>
@@ -16356,8 +16788,130 @@
                 <a:cs typeface="Arial"/>
                 <a:sym typeface="Arial"/>
               </a:rPr>
-              <a:t>	Planejar o gerenciamento dos recursos humanos é o processo de identificação e documentação de papéis, responsabilidades, habilidades necessárias e relações hierárquicas do projeto, além da criação de um plano de gerenciamento de pessoal. O principal benefício desse processo é o estabelecimento dos papéis, responsabilidades e organogramas do projeto, além do plano de gerenciamento de pessoal, incluindo o cronograma para mobilização e liberação de pessoal. </a:t>
+              <a:t>	Planejar o gerenciamento dos custos é o processo de estabelecer as políticas, os procedimentos e a documentação necessários para o planejamento, gerenciamento, despesas, e controle dos custos do projeto. </a:t>
             </a:r>
+          </a:p>
+          <a:p>
+            <a:pPr lvl="0" marL="0" rtl="0" algn="just">
+              <a:lnSpc>
+                <a:spcPct val="115000"/>
+              </a:lnSpc>
+              <a:spcBef>
+                <a:spcPts val="0"/>
+              </a:spcBef>
+              <a:buClr>
+                <a:schemeClr val="dk1"/>
+              </a:buClr>
+              <a:buSzPct val="68750"/>
+              <a:buFont typeface="Arial"/>
+              <a:buNone/>
+            </a:pPr>
+            <a:r>
+              <a:t/>
+            </a:r>
+            <a:endParaRPr b="0">
+              <a:latin typeface="Arial"/>
+              <a:ea typeface="Arial"/>
+              <a:cs typeface="Arial"/>
+              <a:sym typeface="Arial"/>
+            </a:endParaRPr>
+          </a:p>
+          <a:p>
+            <a:pPr lvl="0" marL="0" rtl="0" algn="just">
+              <a:lnSpc>
+                <a:spcPct val="115000"/>
+              </a:lnSpc>
+              <a:spcBef>
+                <a:spcPts val="0"/>
+              </a:spcBef>
+              <a:buClr>
+                <a:schemeClr val="dk1"/>
+              </a:buClr>
+              <a:buSzPct val="68750"/>
+              <a:buFont typeface="Arial"/>
+              <a:buNone/>
+            </a:pPr>
+            <a:r>
+              <a:t/>
+            </a:r>
+            <a:endParaRPr b="0">
+              <a:latin typeface="Arial"/>
+              <a:ea typeface="Arial"/>
+              <a:cs typeface="Arial"/>
+              <a:sym typeface="Arial"/>
+            </a:endParaRPr>
+          </a:p>
+          <a:p>
+            <a:pPr lvl="0" marL="0" rtl="0" algn="just">
+              <a:lnSpc>
+                <a:spcPct val="115000"/>
+              </a:lnSpc>
+              <a:spcBef>
+                <a:spcPts val="0"/>
+              </a:spcBef>
+              <a:buClr>
+                <a:schemeClr val="dk1"/>
+              </a:buClr>
+              <a:buSzPct val="100000"/>
+              <a:buFont typeface="Arial"/>
+              <a:buNone/>
+            </a:pPr>
+            <a:r>
+              <a:rPr i="1" lang="pt-BR">
+                <a:latin typeface="Arial"/>
+                <a:ea typeface="Arial"/>
+                <a:cs typeface="Arial"/>
+                <a:sym typeface="Arial"/>
+              </a:rPr>
+              <a:t>Template:</a:t>
+            </a:r>
+            <a:r>
+              <a:rPr b="0" lang="pt-BR" sz="1100" u="sng">
+                <a:solidFill>
+                  <a:schemeClr val="hlink"/>
+                </a:solidFill>
+                <a:latin typeface="Arial"/>
+                <a:ea typeface="Arial"/>
+                <a:cs typeface="Arial"/>
+                <a:sym typeface="Arial"/>
+                <a:hlinkClick r:id="rId5"/>
+              </a:rPr>
+              <a:t>https://docs.google.com/viewer?url=http://www.inovagp.com/files/plano_de_gerenciamento_de_custo_inovagp.doc</a:t>
+            </a:r>
+            <a:r>
+              <a:rPr b="0" lang="pt-BR" sz="1100">
+                <a:latin typeface="Arial"/>
+                <a:ea typeface="Arial"/>
+                <a:cs typeface="Arial"/>
+                <a:sym typeface="Arial"/>
+              </a:rPr>
+              <a:t> </a:t>
+            </a:r>
+          </a:p>
+          <a:p>
+            <a:pPr lvl="0" marL="0" rtl="0" algn="just">
+              <a:lnSpc>
+                <a:spcPct val="115000"/>
+              </a:lnSpc>
+              <a:spcBef>
+                <a:spcPts val="0"/>
+              </a:spcBef>
+              <a:buClr>
+                <a:schemeClr val="dk1"/>
+              </a:buClr>
+              <a:buSzPct val="68750"/>
+              <a:buFont typeface="Arial"/>
+              <a:buNone/>
+            </a:pPr>
+            <a:r>
+              <a:t/>
+            </a:r>
+            <a:endParaRPr b="0">
+              <a:latin typeface="Arial"/>
+              <a:ea typeface="Arial"/>
+              <a:cs typeface="Arial"/>
+              <a:sym typeface="Arial"/>
+            </a:endParaRPr>
           </a:p>
         </p:txBody>
       </p:sp>

</xml_diff>